<commit_message>
Powerpoint 2 creation with some minor edits
</commit_message>
<xml_diff>
--- a/Documentation/4999 - Sprint2.pptx
+++ b/Documentation/4999 - Sprint2.pptx
@@ -5,28 +5,45 @@
     <p:sldMasterId id="2147483659" r:id="rId1"/>
   </p:sldMasterIdLst>
   <p:notesMasterIdLst>
-    <p:notesMasterId r:id="rId4"/>
+    <p:notesMasterId r:id="rId14"/>
   </p:notesMasterIdLst>
   <p:sldIdLst>
     <p:sldId id="256" r:id="rId2"/>
-    <p:sldId id="264" r:id="rId3"/>
+    <p:sldId id="266" r:id="rId3"/>
+    <p:sldId id="265" r:id="rId4"/>
+    <p:sldId id="267" r:id="rId5"/>
+    <p:sldId id="268" r:id="rId6"/>
+    <p:sldId id="269" r:id="rId7"/>
+    <p:sldId id="270" r:id="rId8"/>
+    <p:sldId id="271" r:id="rId9"/>
+    <p:sldId id="272" r:id="rId10"/>
+    <p:sldId id="273" r:id="rId11"/>
+    <p:sldId id="274" r:id="rId12"/>
+    <p:sldId id="264" r:id="rId13"/>
   </p:sldIdLst>
   <p:sldSz cx="9144000" cy="5143500" type="screen16x9"/>
   <p:notesSz cx="6858000" cy="9144000"/>
   <p:embeddedFontLst>
     <p:embeddedFont>
       <p:font typeface="Montserrat" panose="020B0604020202020204" charset="0"/>
-      <p:regular r:id="rId5"/>
-      <p:bold r:id="rId6"/>
-      <p:italic r:id="rId7"/>
-      <p:boldItalic r:id="rId8"/>
+      <p:regular r:id="rId15"/>
+      <p:bold r:id="rId16"/>
+      <p:italic r:id="rId17"/>
+      <p:boldItalic r:id="rId18"/>
     </p:embeddedFont>
     <p:embeddedFont>
       <p:font typeface="Lato" panose="020B0604020202020204" charset="0"/>
-      <p:regular r:id="rId9"/>
-      <p:bold r:id="rId10"/>
-      <p:italic r:id="rId11"/>
-      <p:boldItalic r:id="rId12"/>
+      <p:regular r:id="rId19"/>
+      <p:bold r:id="rId20"/>
+      <p:italic r:id="rId21"/>
+      <p:boldItalic r:id="rId22"/>
+    </p:embeddedFont>
+    <p:embeddedFont>
+      <p:font typeface="Calibri" panose="020F0502020204030204" pitchFamily="34" charset="0"/>
+      <p:regular r:id="rId23"/>
+      <p:bold r:id="rId24"/>
+      <p:italic r:id="rId25"/>
+      <p:boldItalic r:id="rId26"/>
     </p:embeddedFont>
   </p:embeddedFontLst>
   <p:defaultTextStyle>
@@ -231,6 +248,11 @@
       </a:defRPr>
     </a:lvl9pPr>
   </p:defaultTextStyle>
+  <p:extLst>
+    <p:ext uri="{EFAFB233-063F-42B5-8137-9DF3F51BA10A}">
+      <p15:sldGuideLst xmlns:p15="http://schemas.microsoft.com/office/powerpoint/2012/main"/>
+    </p:ext>
+  </p:extLst>
 </p:presentation>
 </file>
 
@@ -699,7 +721,7 @@
               </a:spcBef>
               <a:buNone/>
             </a:pPr>
-            <a:endParaRPr/>
+            <a:endParaRPr dirty="0"/>
           </a:p>
         </p:txBody>
       </p:sp>
@@ -7221,7 +7243,231 @@
 </p:sld>
 </file>
 
-<file path=ppt/slides/slide2.xml><?xml version="1.0" encoding="utf-8"?>
+<file path=ppt/slides/slide10.xml><?xml version="1.0" encoding="utf-8"?>
+<p:sld xmlns:a="http://schemas.openxmlformats.org/drawingml/2006/main" xmlns:r="http://schemas.openxmlformats.org/officeDocument/2006/relationships" xmlns:p="http://schemas.openxmlformats.org/presentationml/2006/main">
+  <p:cSld>
+    <p:spTree>
+      <p:nvGrpSpPr>
+        <p:cNvPr id="1" name=""/>
+        <p:cNvGrpSpPr/>
+        <p:nvPr/>
+      </p:nvGrpSpPr>
+      <p:grpSpPr>
+        <a:xfrm>
+          <a:off x="0" y="0"/>
+          <a:ext cx="0" cy="0"/>
+          <a:chOff x="0" y="0"/>
+          <a:chExt cx="0" cy="0"/>
+        </a:xfrm>
+      </p:grpSpPr>
+      <p:sp>
+        <p:nvSpPr>
+          <p:cNvPr id="2" name="Title 1"/>
+          <p:cNvSpPr>
+            <a:spLocks noGrp="1"/>
+          </p:cNvSpPr>
+          <p:nvPr>
+            <p:ph type="title"/>
+          </p:nvPr>
+        </p:nvSpPr>
+        <p:spPr/>
+        <p:txBody>
+          <a:bodyPr/>
+          <a:lstStyle/>
+          <a:p>
+            <a:r>
+              <a:rPr lang="en-US" b="1" dirty="0" smtClean="0">
+                <a:latin typeface="Calibri" panose="020F0502020204030204" pitchFamily="34" charset="0"/>
+                <a:ea typeface="Calibri" panose="020F0502020204030204" pitchFamily="34" charset="0"/>
+                <a:cs typeface="Times New Roman" panose="02020603050405020304" pitchFamily="18" charset="0"/>
+              </a:rPr>
+              <a:t>Registration Page</a:t>
+            </a:r>
+            <a:endParaRPr lang="en-US" dirty="0"/>
+          </a:p>
+        </p:txBody>
+      </p:sp>
+      <p:pic>
+        <p:nvPicPr>
+          <p:cNvPr id="5" name="Picture 4"/>
+          <p:cNvPicPr>
+            <a:picLocks noChangeAspect="1"/>
+          </p:cNvPicPr>
+          <p:nvPr/>
+        </p:nvPicPr>
+        <p:blipFill>
+          <a:blip r:embed="rId2"/>
+          <a:stretch>
+            <a:fillRect/>
+          </a:stretch>
+        </p:blipFill>
+        <p:spPr>
+          <a:xfrm>
+            <a:off x="226964" y="1439091"/>
+            <a:ext cx="4113223" cy="3172723"/>
+          </a:xfrm>
+          <a:prstGeom prst="rect">
+            <a:avLst/>
+          </a:prstGeom>
+        </p:spPr>
+      </p:pic>
+      <p:pic>
+        <p:nvPicPr>
+          <p:cNvPr id="7" name="Picture 6"/>
+          <p:cNvPicPr>
+            <a:picLocks noChangeAspect="1"/>
+          </p:cNvPicPr>
+          <p:nvPr/>
+        </p:nvPicPr>
+        <p:blipFill>
+          <a:blip r:embed="rId3"/>
+          <a:stretch>
+            <a:fillRect/>
+          </a:stretch>
+        </p:blipFill>
+        <p:spPr>
+          <a:xfrm>
+            <a:off x="4563331" y="1687285"/>
+            <a:ext cx="4343224" cy="2443843"/>
+          </a:xfrm>
+          <a:prstGeom prst="rect">
+            <a:avLst/>
+          </a:prstGeom>
+        </p:spPr>
+      </p:pic>
+    </p:spTree>
+    <p:extLst>
+      <p:ext uri="{BB962C8B-B14F-4D97-AF65-F5344CB8AC3E}">
+        <p14:creationId xmlns:p14="http://schemas.microsoft.com/office/powerpoint/2010/main" val="1359104789"/>
+      </p:ext>
+    </p:extLst>
+  </p:cSld>
+  <p:clrMapOvr>
+    <a:masterClrMapping/>
+  </p:clrMapOvr>
+  <p:timing>
+    <p:tnLst>
+      <p:par>
+        <p:cTn id="1" dur="indefinite" restart="never" nodeType="tmRoot"/>
+      </p:par>
+    </p:tnLst>
+  </p:timing>
+</p:sld>
+</file>
+
+<file path=ppt/slides/slide11.xml><?xml version="1.0" encoding="utf-8"?>
+<p:sld xmlns:a="http://schemas.openxmlformats.org/drawingml/2006/main" xmlns:r="http://schemas.openxmlformats.org/officeDocument/2006/relationships" xmlns:p="http://schemas.openxmlformats.org/presentationml/2006/main">
+  <p:cSld>
+    <p:spTree>
+      <p:nvGrpSpPr>
+        <p:cNvPr id="1" name=""/>
+        <p:cNvGrpSpPr/>
+        <p:nvPr/>
+      </p:nvGrpSpPr>
+      <p:grpSpPr>
+        <a:xfrm>
+          <a:off x="0" y="0"/>
+          <a:ext cx="0" cy="0"/>
+          <a:chOff x="0" y="0"/>
+          <a:chExt cx="0" cy="0"/>
+        </a:xfrm>
+      </p:grpSpPr>
+      <p:sp>
+        <p:nvSpPr>
+          <p:cNvPr id="2" name="Title 1"/>
+          <p:cNvSpPr>
+            <a:spLocks noGrp="1"/>
+          </p:cNvSpPr>
+          <p:nvPr>
+            <p:ph type="title"/>
+          </p:nvPr>
+        </p:nvSpPr>
+        <p:spPr/>
+        <p:txBody>
+          <a:bodyPr/>
+          <a:lstStyle/>
+          <a:p>
+            <a:r>
+              <a:rPr lang="en-US" b="1" dirty="0" smtClean="0">
+                <a:latin typeface="Calibri" panose="020F0502020204030204" pitchFamily="34" charset="0"/>
+                <a:ea typeface="Calibri" panose="020F0502020204030204" pitchFamily="34" charset="0"/>
+                <a:cs typeface="Times New Roman" panose="02020603050405020304" pitchFamily="18" charset="0"/>
+              </a:rPr>
+              <a:t>Sign In</a:t>
+            </a:r>
+            <a:endParaRPr lang="en-US" dirty="0"/>
+          </a:p>
+        </p:txBody>
+      </p:sp>
+      <p:pic>
+        <p:nvPicPr>
+          <p:cNvPr id="3" name="Picture 2"/>
+          <p:cNvPicPr>
+            <a:picLocks noChangeAspect="1"/>
+          </p:cNvPicPr>
+          <p:nvPr/>
+        </p:nvPicPr>
+        <p:blipFill>
+          <a:blip r:embed="rId2"/>
+          <a:stretch>
+            <a:fillRect/>
+          </a:stretch>
+        </p:blipFill>
+        <p:spPr>
+          <a:xfrm>
+            <a:off x="235812" y="1667905"/>
+            <a:ext cx="3845377" cy="2921454"/>
+          </a:xfrm>
+          <a:prstGeom prst="rect">
+            <a:avLst/>
+          </a:prstGeom>
+        </p:spPr>
+      </p:pic>
+      <p:pic>
+        <p:nvPicPr>
+          <p:cNvPr id="6" name="Picture 5"/>
+          <p:cNvPicPr>
+            <a:picLocks noChangeAspect="1"/>
+          </p:cNvPicPr>
+          <p:nvPr/>
+        </p:nvPicPr>
+        <p:blipFill>
+          <a:blip r:embed="rId3"/>
+          <a:stretch>
+            <a:fillRect/>
+          </a:stretch>
+        </p:blipFill>
+        <p:spPr>
+          <a:xfrm>
+            <a:off x="4181937" y="1732422"/>
+            <a:ext cx="4854113" cy="2792420"/>
+          </a:xfrm>
+          <a:prstGeom prst="rect">
+            <a:avLst/>
+          </a:prstGeom>
+        </p:spPr>
+      </p:pic>
+    </p:spTree>
+    <p:extLst>
+      <p:ext uri="{BB962C8B-B14F-4D97-AF65-F5344CB8AC3E}">
+        <p14:creationId xmlns:p14="http://schemas.microsoft.com/office/powerpoint/2010/main" val="1499641632"/>
+      </p:ext>
+    </p:extLst>
+  </p:cSld>
+  <p:clrMapOvr>
+    <a:masterClrMapping/>
+  </p:clrMapOvr>
+  <p:timing>
+    <p:tnLst>
+      <p:par>
+        <p:cTn id="1" dur="indefinite" restart="never" nodeType="tmRoot"/>
+      </p:par>
+    </p:tnLst>
+  </p:timing>
+</p:sld>
+</file>
+
+<file path=ppt/slides/slide12.xml><?xml version="1.0" encoding="utf-8"?>
 <p:sld xmlns:a="http://schemas.openxmlformats.org/drawingml/2006/main" xmlns:r="http://schemas.openxmlformats.org/officeDocument/2006/relationships" xmlns:p="http://schemas.openxmlformats.org/presentationml/2006/main">
   <p:cSld>
     <p:spTree>
@@ -7277,6 +7523,2542 @@
         </p:txBody>
       </p:sp>
     </p:spTree>
+  </p:cSld>
+  <p:clrMapOvr>
+    <a:masterClrMapping/>
+  </p:clrMapOvr>
+  <p:timing>
+    <p:tnLst>
+      <p:par>
+        <p:cTn id="1" dur="indefinite" restart="never" nodeType="tmRoot"/>
+      </p:par>
+    </p:tnLst>
+  </p:timing>
+</p:sld>
+</file>
+
+<file path=ppt/slides/slide2.xml><?xml version="1.0" encoding="utf-8"?>
+<p:sld xmlns:a="http://schemas.openxmlformats.org/drawingml/2006/main" xmlns:r="http://schemas.openxmlformats.org/officeDocument/2006/relationships" xmlns:p="http://schemas.openxmlformats.org/presentationml/2006/main">
+  <p:cSld>
+    <p:spTree>
+      <p:nvGrpSpPr>
+        <p:cNvPr id="1" name=""/>
+        <p:cNvGrpSpPr/>
+        <p:nvPr/>
+      </p:nvGrpSpPr>
+      <p:grpSpPr>
+        <a:xfrm>
+          <a:off x="0" y="0"/>
+          <a:ext cx="0" cy="0"/>
+          <a:chOff x="0" y="0"/>
+          <a:chExt cx="0" cy="0"/>
+        </a:xfrm>
+      </p:grpSpPr>
+      <p:sp>
+        <p:nvSpPr>
+          <p:cNvPr id="2" name="Title 1"/>
+          <p:cNvSpPr>
+            <a:spLocks noGrp="1"/>
+          </p:cNvSpPr>
+          <p:nvPr>
+            <p:ph type="title"/>
+          </p:nvPr>
+        </p:nvSpPr>
+        <p:spPr/>
+        <p:txBody>
+          <a:bodyPr/>
+          <a:lstStyle/>
+          <a:p>
+            <a:r>
+              <a:rPr lang="en-US" dirty="0" smtClean="0"/>
+              <a:t>Sprint Goals	</a:t>
+            </a:r>
+            <a:endParaRPr lang="en-US" dirty="0"/>
+          </a:p>
+        </p:txBody>
+      </p:sp>
+      <p:sp>
+        <p:nvSpPr>
+          <p:cNvPr id="3" name="Text Placeholder 2"/>
+          <p:cNvSpPr>
+            <a:spLocks noGrp="1"/>
+          </p:cNvSpPr>
+          <p:nvPr>
+            <p:ph type="body" idx="1"/>
+          </p:nvPr>
+        </p:nvSpPr>
+        <p:spPr>
+          <a:xfrm>
+            <a:off x="3189002" y="1452597"/>
+            <a:ext cx="3776114" cy="2911200"/>
+          </a:xfrm>
+        </p:spPr>
+        <p:txBody>
+          <a:bodyPr/>
+          <a:lstStyle/>
+          <a:p>
+            <a:r>
+              <a:rPr lang="en-US" dirty="0" smtClean="0"/>
+              <a:t>Use Case Creation</a:t>
+            </a:r>
+          </a:p>
+          <a:p>
+            <a:r>
+              <a:rPr lang="en-US" dirty="0" smtClean="0"/>
+              <a:t>Wireframe Creation</a:t>
+            </a:r>
+          </a:p>
+          <a:p>
+            <a:r>
+              <a:rPr lang="en-US" dirty="0" smtClean="0"/>
+              <a:t>User Registration Functionality </a:t>
+            </a:r>
+          </a:p>
+          <a:p>
+            <a:r>
+              <a:rPr lang="en-US" dirty="0" smtClean="0"/>
+              <a:t>Website Layout/Flow creation</a:t>
+            </a:r>
+          </a:p>
+        </p:txBody>
+      </p:sp>
+    </p:spTree>
+    <p:extLst>
+      <p:ext uri="{BB962C8B-B14F-4D97-AF65-F5344CB8AC3E}">
+        <p14:creationId xmlns:p14="http://schemas.microsoft.com/office/powerpoint/2010/main" val="2729086324"/>
+      </p:ext>
+    </p:extLst>
+  </p:cSld>
+  <p:clrMapOvr>
+    <a:masterClrMapping/>
+  </p:clrMapOvr>
+  <p:timing>
+    <p:tnLst>
+      <p:par>
+        <p:cTn id="1" dur="indefinite" restart="never" nodeType="tmRoot"/>
+      </p:par>
+    </p:tnLst>
+  </p:timing>
+</p:sld>
+</file>
+
+<file path=ppt/slides/slide3.xml><?xml version="1.0" encoding="utf-8"?>
+<p:sld xmlns:a="http://schemas.openxmlformats.org/drawingml/2006/main" xmlns:r="http://schemas.openxmlformats.org/officeDocument/2006/relationships" xmlns:p="http://schemas.openxmlformats.org/presentationml/2006/main">
+  <p:cSld>
+    <p:spTree>
+      <p:nvGrpSpPr>
+        <p:cNvPr id="1" name=""/>
+        <p:cNvGrpSpPr/>
+        <p:nvPr/>
+      </p:nvGrpSpPr>
+      <p:grpSpPr>
+        <a:xfrm>
+          <a:off x="0" y="0"/>
+          <a:ext cx="0" cy="0"/>
+          <a:chOff x="0" y="0"/>
+          <a:chExt cx="0" cy="0"/>
+        </a:xfrm>
+      </p:grpSpPr>
+      <p:sp>
+        <p:nvSpPr>
+          <p:cNvPr id="2" name="Title 1"/>
+          <p:cNvSpPr>
+            <a:spLocks noGrp="1"/>
+          </p:cNvSpPr>
+          <p:nvPr>
+            <p:ph type="title"/>
+          </p:nvPr>
+        </p:nvSpPr>
+        <p:spPr/>
+        <p:txBody>
+          <a:bodyPr/>
+          <a:lstStyle/>
+          <a:p>
+            <a:r>
+              <a:rPr lang="en-US" dirty="0" smtClean="0"/>
+              <a:t>Main Use Cases</a:t>
+            </a:r>
+            <a:endParaRPr lang="en-US" dirty="0"/>
+          </a:p>
+        </p:txBody>
+      </p:sp>
+    </p:spTree>
+    <p:extLst>
+      <p:ext uri="{BB962C8B-B14F-4D97-AF65-F5344CB8AC3E}">
+        <p14:creationId xmlns:p14="http://schemas.microsoft.com/office/powerpoint/2010/main" val="666669451"/>
+      </p:ext>
+    </p:extLst>
+  </p:cSld>
+  <p:clrMapOvr>
+    <a:masterClrMapping/>
+  </p:clrMapOvr>
+  <p:timing>
+    <p:tnLst>
+      <p:par>
+        <p:cTn id="1" dur="indefinite" restart="never" nodeType="tmRoot"/>
+      </p:par>
+    </p:tnLst>
+  </p:timing>
+</p:sld>
+</file>
+
+<file path=ppt/slides/slide4.xml><?xml version="1.0" encoding="utf-8"?>
+<p:sld xmlns:a="http://schemas.openxmlformats.org/drawingml/2006/main" xmlns:r="http://schemas.openxmlformats.org/officeDocument/2006/relationships" xmlns:p="http://schemas.openxmlformats.org/presentationml/2006/main">
+  <p:cSld>
+    <p:spTree>
+      <p:nvGrpSpPr>
+        <p:cNvPr id="1" name=""/>
+        <p:cNvGrpSpPr/>
+        <p:nvPr/>
+      </p:nvGrpSpPr>
+      <p:grpSpPr>
+        <a:xfrm>
+          <a:off x="0" y="0"/>
+          <a:ext cx="0" cy="0"/>
+          <a:chOff x="0" y="0"/>
+          <a:chExt cx="0" cy="0"/>
+        </a:xfrm>
+      </p:grpSpPr>
+      <p:sp>
+        <p:nvSpPr>
+          <p:cNvPr id="2" name="Title 1"/>
+          <p:cNvSpPr>
+            <a:spLocks noGrp="1"/>
+          </p:cNvSpPr>
+          <p:nvPr>
+            <p:ph type="title"/>
+          </p:nvPr>
+        </p:nvSpPr>
+        <p:spPr/>
+        <p:txBody>
+          <a:bodyPr/>
+          <a:lstStyle/>
+          <a:p>
+            <a:r>
+              <a:rPr lang="en-US" dirty="0" smtClean="0"/>
+              <a:t>Use </a:t>
+            </a:r>
+            <a:r>
+              <a:rPr lang="en-US" dirty="0"/>
+              <a:t>Case UC-1: Generate Account Information</a:t>
+            </a:r>
+          </a:p>
+        </p:txBody>
+      </p:sp>
+      <p:sp>
+        <p:nvSpPr>
+          <p:cNvPr id="3" name="Text Placeholder 2"/>
+          <p:cNvSpPr>
+            <a:spLocks noGrp="1"/>
+          </p:cNvSpPr>
+          <p:nvPr>
+            <p:ph type="body" idx="1"/>
+          </p:nvPr>
+        </p:nvSpPr>
+        <p:spPr>
+          <a:xfrm>
+            <a:off x="1297500" y="1567550"/>
+            <a:ext cx="7038900" cy="3575950"/>
+          </a:xfrm>
+        </p:spPr>
+        <p:txBody>
+          <a:bodyPr/>
+          <a:lstStyle/>
+          <a:p>
+            <a:pPr marL="742950" lvl="1" indent="-285750">
+              <a:lnSpc>
+                <a:spcPct val="107000"/>
+              </a:lnSpc>
+              <a:spcAft>
+                <a:spcPts val="0"/>
+              </a:spcAft>
+              <a:buFont typeface="Courier New" panose="02070309020205020404" pitchFamily="49" charset="0"/>
+              <a:buChar char="o"/>
+            </a:pPr>
+            <a:r>
+              <a:rPr lang="en-US" b="1" dirty="0">
+                <a:latin typeface="Calibri" panose="020F0502020204030204" pitchFamily="34" charset="0"/>
+                <a:ea typeface="Calibri" panose="020F0502020204030204" pitchFamily="34" charset="0"/>
+                <a:cs typeface="Times New Roman" panose="02020603050405020304" pitchFamily="18" charset="0"/>
+              </a:rPr>
+              <a:t>Summary:</a:t>
+            </a:r>
+            <a:endParaRPr lang="en-US" sz="1050" dirty="0">
+              <a:latin typeface="Calibri" panose="020F0502020204030204" pitchFamily="34" charset="0"/>
+              <a:ea typeface="Calibri" panose="020F0502020204030204" pitchFamily="34" charset="0"/>
+              <a:cs typeface="Times New Roman" panose="02020603050405020304" pitchFamily="18" charset="0"/>
+            </a:endParaRPr>
+          </a:p>
+          <a:p>
+            <a:pPr marL="1143000" lvl="2" indent="-228600">
+              <a:lnSpc>
+                <a:spcPct val="107000"/>
+              </a:lnSpc>
+              <a:spcAft>
+                <a:spcPts val="0"/>
+              </a:spcAft>
+              <a:buFont typeface="Wingdings" panose="05000000000000000000" pitchFamily="2" charset="2"/>
+              <a:buChar char=""/>
+            </a:pPr>
+            <a:r>
+              <a:rPr lang="en-US" dirty="0">
+                <a:latin typeface="Calibri" panose="020F0502020204030204" pitchFamily="34" charset="0"/>
+                <a:ea typeface="Calibri" panose="020F0502020204030204" pitchFamily="34" charset="0"/>
+                <a:cs typeface="Times New Roman" panose="02020603050405020304" pitchFamily="18" charset="0"/>
+              </a:rPr>
+              <a:t>This use case is designed for users who don’t already have an account. When a user first visits our website he/she will click on “Get Started”. At this point, a user will enter valid information in the steps for creating an account. Once all the required fields contain data, the user will click “Create”. As soon as the data is retrieved by the database, the user is signed into their new account.</a:t>
+            </a:r>
+            <a:endParaRPr lang="en-US" sz="1050" dirty="0">
+              <a:latin typeface="Calibri" panose="020F0502020204030204" pitchFamily="34" charset="0"/>
+              <a:ea typeface="Calibri" panose="020F0502020204030204" pitchFamily="34" charset="0"/>
+              <a:cs typeface="Times New Roman" panose="02020603050405020304" pitchFamily="18" charset="0"/>
+            </a:endParaRPr>
+          </a:p>
+          <a:p>
+            <a:pPr marL="742950" lvl="1" indent="-285750">
+              <a:lnSpc>
+                <a:spcPct val="107000"/>
+              </a:lnSpc>
+              <a:spcAft>
+                <a:spcPts val="0"/>
+              </a:spcAft>
+              <a:buFont typeface="Courier New" panose="02070309020205020404" pitchFamily="49" charset="0"/>
+              <a:buChar char="o"/>
+            </a:pPr>
+            <a:r>
+              <a:rPr lang="en-US" b="1" dirty="0">
+                <a:latin typeface="Calibri" panose="020F0502020204030204" pitchFamily="34" charset="0"/>
+                <a:ea typeface="Calibri" panose="020F0502020204030204" pitchFamily="34" charset="0"/>
+                <a:cs typeface="Times New Roman" panose="02020603050405020304" pitchFamily="18" charset="0"/>
+              </a:rPr>
+              <a:t>Initiating Actor(s):</a:t>
+            </a:r>
+            <a:endParaRPr lang="en-US" sz="1050" dirty="0">
+              <a:latin typeface="Calibri" panose="020F0502020204030204" pitchFamily="34" charset="0"/>
+              <a:ea typeface="Calibri" panose="020F0502020204030204" pitchFamily="34" charset="0"/>
+              <a:cs typeface="Times New Roman" panose="02020603050405020304" pitchFamily="18" charset="0"/>
+            </a:endParaRPr>
+          </a:p>
+          <a:p>
+            <a:pPr marL="1143000" lvl="2" indent="-228600">
+              <a:lnSpc>
+                <a:spcPct val="107000"/>
+              </a:lnSpc>
+              <a:spcAft>
+                <a:spcPts val="0"/>
+              </a:spcAft>
+              <a:buFont typeface="Wingdings" panose="05000000000000000000" pitchFamily="2" charset="2"/>
+              <a:buChar char=""/>
+            </a:pPr>
+            <a:r>
+              <a:rPr lang="en-US" dirty="0">
+                <a:latin typeface="Calibri" panose="020F0502020204030204" pitchFamily="34" charset="0"/>
+                <a:ea typeface="Calibri" panose="020F0502020204030204" pitchFamily="34" charset="0"/>
+                <a:cs typeface="Times New Roman" panose="02020603050405020304" pitchFamily="18" charset="0"/>
+              </a:rPr>
+              <a:t>Customer</a:t>
+            </a:r>
+            <a:endParaRPr lang="en-US" sz="1050" dirty="0">
+              <a:latin typeface="Calibri" panose="020F0502020204030204" pitchFamily="34" charset="0"/>
+              <a:ea typeface="Calibri" panose="020F0502020204030204" pitchFamily="34" charset="0"/>
+              <a:cs typeface="Times New Roman" panose="02020603050405020304" pitchFamily="18" charset="0"/>
+            </a:endParaRPr>
+          </a:p>
+          <a:p>
+            <a:pPr marL="742950" lvl="1" indent="-285750">
+              <a:lnSpc>
+                <a:spcPct val="107000"/>
+              </a:lnSpc>
+              <a:spcAft>
+                <a:spcPts val="0"/>
+              </a:spcAft>
+              <a:buFont typeface="Courier New" panose="02070309020205020404" pitchFamily="49" charset="0"/>
+              <a:buChar char="o"/>
+            </a:pPr>
+            <a:r>
+              <a:rPr lang="en-US" b="1" dirty="0">
+                <a:latin typeface="Calibri" panose="020F0502020204030204" pitchFamily="34" charset="0"/>
+                <a:ea typeface="Calibri" panose="020F0502020204030204" pitchFamily="34" charset="0"/>
+                <a:cs typeface="Times New Roman" panose="02020603050405020304" pitchFamily="18" charset="0"/>
+              </a:rPr>
+              <a:t>Actor’s Goal:</a:t>
+            </a:r>
+            <a:endParaRPr lang="en-US" sz="1050" dirty="0">
+              <a:latin typeface="Calibri" panose="020F0502020204030204" pitchFamily="34" charset="0"/>
+              <a:ea typeface="Calibri" panose="020F0502020204030204" pitchFamily="34" charset="0"/>
+              <a:cs typeface="Times New Roman" panose="02020603050405020304" pitchFamily="18" charset="0"/>
+            </a:endParaRPr>
+          </a:p>
+          <a:p>
+            <a:pPr marL="1143000" lvl="2" indent="-228600">
+              <a:lnSpc>
+                <a:spcPct val="107000"/>
+              </a:lnSpc>
+              <a:spcAft>
+                <a:spcPts val="0"/>
+              </a:spcAft>
+              <a:buFont typeface="Wingdings" panose="05000000000000000000" pitchFamily="2" charset="2"/>
+              <a:buChar char=""/>
+            </a:pPr>
+            <a:r>
+              <a:rPr lang="en-US" dirty="0">
+                <a:latin typeface="Calibri" panose="020F0502020204030204" pitchFamily="34" charset="0"/>
+                <a:ea typeface="Calibri" panose="020F0502020204030204" pitchFamily="34" charset="0"/>
+                <a:cs typeface="Times New Roman" panose="02020603050405020304" pitchFamily="18" charset="0"/>
+              </a:rPr>
+              <a:t>Register for </a:t>
+            </a:r>
+            <a:r>
+              <a:rPr lang="en-US" dirty="0" err="1">
+                <a:latin typeface="Calibri" panose="020F0502020204030204" pitchFamily="34" charset="0"/>
+                <a:ea typeface="Calibri" panose="020F0502020204030204" pitchFamily="34" charset="0"/>
+                <a:cs typeface="Times New Roman" panose="02020603050405020304" pitchFamily="18" charset="0"/>
+              </a:rPr>
+              <a:t>SportPlex</a:t>
+            </a:r>
+            <a:r>
+              <a:rPr lang="en-US" dirty="0">
+                <a:latin typeface="Calibri" panose="020F0502020204030204" pitchFamily="34" charset="0"/>
+                <a:ea typeface="Calibri" panose="020F0502020204030204" pitchFamily="34" charset="0"/>
+                <a:cs typeface="Times New Roman" panose="02020603050405020304" pitchFamily="18" charset="0"/>
+              </a:rPr>
+              <a:t> website and capability to review account information.</a:t>
+            </a:r>
+            <a:endParaRPr lang="en-US" sz="1050" dirty="0">
+              <a:latin typeface="Calibri" panose="020F0502020204030204" pitchFamily="34" charset="0"/>
+              <a:ea typeface="Calibri" panose="020F0502020204030204" pitchFamily="34" charset="0"/>
+              <a:cs typeface="Times New Roman" panose="02020603050405020304" pitchFamily="18" charset="0"/>
+            </a:endParaRPr>
+          </a:p>
+          <a:p>
+            <a:pPr marL="742950" lvl="1" indent="-285750">
+              <a:lnSpc>
+                <a:spcPct val="107000"/>
+              </a:lnSpc>
+              <a:spcAft>
+                <a:spcPts val="0"/>
+              </a:spcAft>
+              <a:buFont typeface="Courier New" panose="02070309020205020404" pitchFamily="49" charset="0"/>
+              <a:buChar char="o"/>
+            </a:pPr>
+            <a:r>
+              <a:rPr lang="en-US" b="1" dirty="0">
+                <a:latin typeface="Calibri" panose="020F0502020204030204" pitchFamily="34" charset="0"/>
+                <a:ea typeface="Calibri" panose="020F0502020204030204" pitchFamily="34" charset="0"/>
+                <a:cs typeface="Times New Roman" panose="02020603050405020304" pitchFamily="18" charset="0"/>
+              </a:rPr>
+              <a:t>Preconditions:</a:t>
+            </a:r>
+            <a:endParaRPr lang="en-US" sz="1050" dirty="0">
+              <a:latin typeface="Calibri" panose="020F0502020204030204" pitchFamily="34" charset="0"/>
+              <a:ea typeface="Calibri" panose="020F0502020204030204" pitchFamily="34" charset="0"/>
+              <a:cs typeface="Times New Roman" panose="02020603050405020304" pitchFamily="18" charset="0"/>
+            </a:endParaRPr>
+          </a:p>
+          <a:p>
+            <a:pPr marL="1143000" lvl="2" indent="-228600">
+              <a:lnSpc>
+                <a:spcPct val="107000"/>
+              </a:lnSpc>
+              <a:spcAft>
+                <a:spcPts val="800"/>
+              </a:spcAft>
+              <a:buFont typeface="Wingdings" panose="05000000000000000000" pitchFamily="2" charset="2"/>
+              <a:buChar char=""/>
+            </a:pPr>
+            <a:r>
+              <a:rPr lang="en-US" dirty="0">
+                <a:latin typeface="Calibri" panose="020F0502020204030204" pitchFamily="34" charset="0"/>
+                <a:ea typeface="Calibri" panose="020F0502020204030204" pitchFamily="34" charset="0"/>
+                <a:cs typeface="Times New Roman" panose="02020603050405020304" pitchFamily="18" charset="0"/>
+              </a:rPr>
+              <a:t>A customer doesn’t have an account affiliated with them.</a:t>
+            </a:r>
+            <a:endParaRPr lang="en-US" sz="1050" dirty="0">
+              <a:latin typeface="Calibri" panose="020F0502020204030204" pitchFamily="34" charset="0"/>
+              <a:ea typeface="Calibri" panose="020F0502020204030204" pitchFamily="34" charset="0"/>
+              <a:cs typeface="Times New Roman" panose="02020603050405020304" pitchFamily="18" charset="0"/>
+            </a:endParaRPr>
+          </a:p>
+          <a:p>
+            <a:pPr marL="1143000" lvl="2" indent="-228600">
+              <a:lnSpc>
+                <a:spcPct val="107000"/>
+              </a:lnSpc>
+              <a:spcAft>
+                <a:spcPts val="800"/>
+              </a:spcAft>
+              <a:buFont typeface="Wingdings" panose="05000000000000000000" pitchFamily="2" charset="2"/>
+              <a:buChar char=""/>
+            </a:pPr>
+            <a:r>
+              <a:rPr lang="en-US" dirty="0" smtClean="0">
+                <a:latin typeface="Calibri" panose="020F0502020204030204" pitchFamily="34" charset="0"/>
+                <a:ea typeface="Calibri" panose="020F0502020204030204" pitchFamily="34" charset="0"/>
+                <a:cs typeface="Times New Roman" panose="02020603050405020304" pitchFamily="18" charset="0"/>
+              </a:rPr>
+              <a:t>Administrator</a:t>
+            </a:r>
+          </a:p>
+          <a:p>
+            <a:pPr marL="742950" lvl="1" indent="-285750">
+              <a:lnSpc>
+                <a:spcPct val="107000"/>
+              </a:lnSpc>
+              <a:spcAft>
+                <a:spcPts val="0"/>
+              </a:spcAft>
+              <a:buFont typeface="Courier New" panose="02070309020205020404" pitchFamily="49" charset="0"/>
+              <a:buChar char="o"/>
+            </a:pPr>
+            <a:r>
+              <a:rPr lang="en-US" b="1" dirty="0" err="1">
+                <a:latin typeface="Calibri" panose="020F0502020204030204" pitchFamily="34" charset="0"/>
+                <a:ea typeface="Calibri" panose="020F0502020204030204" pitchFamily="34" charset="0"/>
+                <a:cs typeface="Times New Roman" panose="02020603050405020304" pitchFamily="18" charset="0"/>
+              </a:rPr>
+              <a:t>Postconditions</a:t>
+            </a:r>
+            <a:r>
+              <a:rPr lang="en-US" b="1" dirty="0">
+                <a:latin typeface="Calibri" panose="020F0502020204030204" pitchFamily="34" charset="0"/>
+                <a:ea typeface="Calibri" panose="020F0502020204030204" pitchFamily="34" charset="0"/>
+                <a:cs typeface="Times New Roman" panose="02020603050405020304" pitchFamily="18" charset="0"/>
+              </a:rPr>
+              <a:t>:</a:t>
+            </a:r>
+            <a:endParaRPr lang="en-US" sz="1050" dirty="0">
+              <a:latin typeface="Calibri" panose="020F0502020204030204" pitchFamily="34" charset="0"/>
+              <a:ea typeface="Calibri" panose="020F0502020204030204" pitchFamily="34" charset="0"/>
+              <a:cs typeface="Times New Roman" panose="02020603050405020304" pitchFamily="18" charset="0"/>
+            </a:endParaRPr>
+          </a:p>
+          <a:p>
+            <a:pPr marL="1143000" lvl="2" indent="-228600">
+              <a:lnSpc>
+                <a:spcPct val="107000"/>
+              </a:lnSpc>
+              <a:spcAft>
+                <a:spcPts val="0"/>
+              </a:spcAft>
+              <a:buFont typeface="Wingdings" panose="05000000000000000000" pitchFamily="2" charset="2"/>
+              <a:buChar char=""/>
+            </a:pPr>
+            <a:r>
+              <a:rPr lang="en-US" dirty="0">
+                <a:latin typeface="Calibri" panose="020F0502020204030204" pitchFamily="34" charset="0"/>
+                <a:ea typeface="Calibri" panose="020F0502020204030204" pitchFamily="34" charset="0"/>
+                <a:cs typeface="Times New Roman" panose="02020603050405020304" pitchFamily="18" charset="0"/>
+              </a:rPr>
+              <a:t>Customers gain access to User’s home page.</a:t>
+            </a:r>
+            <a:endParaRPr lang="en-US" sz="1050" dirty="0">
+              <a:latin typeface="Calibri" panose="020F0502020204030204" pitchFamily="34" charset="0"/>
+              <a:ea typeface="Calibri" panose="020F0502020204030204" pitchFamily="34" charset="0"/>
+              <a:cs typeface="Times New Roman" panose="02020603050405020304" pitchFamily="18" charset="0"/>
+            </a:endParaRPr>
+          </a:p>
+          <a:p>
+            <a:pPr marL="1143000" lvl="2" indent="-228600">
+              <a:lnSpc>
+                <a:spcPct val="107000"/>
+              </a:lnSpc>
+              <a:spcAft>
+                <a:spcPts val="800"/>
+              </a:spcAft>
+              <a:buFont typeface="Wingdings" panose="05000000000000000000" pitchFamily="2" charset="2"/>
+              <a:buChar char=""/>
+            </a:pPr>
+            <a:r>
+              <a:rPr lang="en-US" dirty="0">
+                <a:latin typeface="Calibri" panose="020F0502020204030204" pitchFamily="34" charset="0"/>
+                <a:ea typeface="Calibri" panose="020F0502020204030204" pitchFamily="34" charset="0"/>
+                <a:cs typeface="Times New Roman" panose="02020603050405020304" pitchFamily="18" charset="0"/>
+              </a:rPr>
+              <a:t>Added features are now available to view.</a:t>
+            </a:r>
+            <a:endParaRPr lang="en-US" sz="1050" dirty="0">
+              <a:latin typeface="Calibri" panose="020F0502020204030204" pitchFamily="34" charset="0"/>
+              <a:ea typeface="Calibri" panose="020F0502020204030204" pitchFamily="34" charset="0"/>
+              <a:cs typeface="Times New Roman" panose="02020603050405020304" pitchFamily="18" charset="0"/>
+            </a:endParaRPr>
+          </a:p>
+          <a:p>
+            <a:pPr marL="1143000" lvl="2" indent="-228600">
+              <a:lnSpc>
+                <a:spcPct val="107000"/>
+              </a:lnSpc>
+              <a:spcAft>
+                <a:spcPts val="800"/>
+              </a:spcAft>
+              <a:buFont typeface="Wingdings" panose="05000000000000000000" pitchFamily="2" charset="2"/>
+              <a:buChar char=""/>
+            </a:pPr>
+            <a:endParaRPr lang="en-US" sz="1050" dirty="0" smtClean="0">
+              <a:latin typeface="Calibri" panose="020F0502020204030204" pitchFamily="34" charset="0"/>
+              <a:ea typeface="Calibri" panose="020F0502020204030204" pitchFamily="34" charset="0"/>
+              <a:cs typeface="Times New Roman" panose="02020603050405020304" pitchFamily="18" charset="0"/>
+            </a:endParaRPr>
+          </a:p>
+          <a:p>
+            <a:endParaRPr lang="en-US" dirty="0"/>
+          </a:p>
+        </p:txBody>
+      </p:sp>
+    </p:spTree>
+    <p:extLst>
+      <p:ext uri="{BB962C8B-B14F-4D97-AF65-F5344CB8AC3E}">
+        <p14:creationId xmlns:p14="http://schemas.microsoft.com/office/powerpoint/2010/main" val="1668947270"/>
+      </p:ext>
+    </p:extLst>
+  </p:cSld>
+  <p:clrMapOvr>
+    <a:masterClrMapping/>
+  </p:clrMapOvr>
+  <p:timing>
+    <p:tnLst>
+      <p:par>
+        <p:cTn id="1" dur="indefinite" restart="never" nodeType="tmRoot"/>
+      </p:par>
+    </p:tnLst>
+  </p:timing>
+</p:sld>
+</file>
+
+<file path=ppt/slides/slide5.xml><?xml version="1.0" encoding="utf-8"?>
+<p:sld xmlns:a="http://schemas.openxmlformats.org/drawingml/2006/main" xmlns:r="http://schemas.openxmlformats.org/officeDocument/2006/relationships" xmlns:p="http://schemas.openxmlformats.org/presentationml/2006/main">
+  <p:cSld>
+    <p:spTree>
+      <p:nvGrpSpPr>
+        <p:cNvPr id="1" name=""/>
+        <p:cNvGrpSpPr/>
+        <p:nvPr/>
+      </p:nvGrpSpPr>
+      <p:grpSpPr>
+        <a:xfrm>
+          <a:off x="0" y="0"/>
+          <a:ext cx="0" cy="0"/>
+          <a:chOff x="0" y="0"/>
+          <a:chExt cx="0" cy="0"/>
+        </a:xfrm>
+      </p:grpSpPr>
+      <p:sp>
+        <p:nvSpPr>
+          <p:cNvPr id="3" name="Text Placeholder 2"/>
+          <p:cNvSpPr>
+            <a:spLocks noGrp="1"/>
+          </p:cNvSpPr>
+          <p:nvPr>
+            <p:ph type="body" idx="1"/>
+          </p:nvPr>
+        </p:nvSpPr>
+        <p:spPr>
+          <a:xfrm>
+            <a:off x="1334077" y="135861"/>
+            <a:ext cx="7038900" cy="3575950"/>
+          </a:xfrm>
+        </p:spPr>
+        <p:txBody>
+          <a:bodyPr/>
+          <a:lstStyle/>
+          <a:p>
+            <a:pPr marL="742950" lvl="1" indent="-285750">
+              <a:lnSpc>
+                <a:spcPct val="107000"/>
+              </a:lnSpc>
+              <a:spcAft>
+                <a:spcPts val="0"/>
+              </a:spcAft>
+              <a:buFont typeface="Courier New" panose="02070309020205020404" pitchFamily="49" charset="0"/>
+              <a:buChar char="o"/>
+            </a:pPr>
+            <a:r>
+              <a:rPr lang="en-US" b="1" dirty="0">
+                <a:latin typeface="Calibri" panose="020F0502020204030204" pitchFamily="34" charset="0"/>
+                <a:ea typeface="Calibri" panose="020F0502020204030204" pitchFamily="34" charset="0"/>
+                <a:cs typeface="Times New Roman" panose="02020603050405020304" pitchFamily="18" charset="0"/>
+              </a:rPr>
+              <a:t>Flow of events for Main Success Scenario:</a:t>
+            </a:r>
+            <a:endParaRPr lang="en-US" sz="1050" dirty="0">
+              <a:latin typeface="Calibri" panose="020F0502020204030204" pitchFamily="34" charset="0"/>
+              <a:ea typeface="Calibri" panose="020F0502020204030204" pitchFamily="34" charset="0"/>
+              <a:cs typeface="Times New Roman" panose="02020603050405020304" pitchFamily="18" charset="0"/>
+            </a:endParaRPr>
+          </a:p>
+          <a:p>
+            <a:pPr marL="1143000" lvl="2" indent="-228600">
+              <a:lnSpc>
+                <a:spcPct val="107000"/>
+              </a:lnSpc>
+              <a:spcAft>
+                <a:spcPts val="0"/>
+              </a:spcAft>
+              <a:buFont typeface="Wingdings" panose="05000000000000000000" pitchFamily="2" charset="2"/>
+              <a:buChar char=""/>
+            </a:pPr>
+            <a:r>
+              <a:rPr lang="en-US" dirty="0">
+                <a:latin typeface="Calibri" panose="020F0502020204030204" pitchFamily="34" charset="0"/>
+                <a:ea typeface="Calibri" panose="020F0502020204030204" pitchFamily="34" charset="0"/>
+                <a:cs typeface="Times New Roman" panose="02020603050405020304" pitchFamily="18" charset="0"/>
+              </a:rPr>
+              <a:t>Customer Presses the “Registration Button” (Trigger Action)</a:t>
+            </a:r>
+            <a:endParaRPr lang="en-US" sz="1050" dirty="0">
+              <a:latin typeface="Calibri" panose="020F0502020204030204" pitchFamily="34" charset="0"/>
+              <a:ea typeface="Calibri" panose="020F0502020204030204" pitchFamily="34" charset="0"/>
+              <a:cs typeface="Times New Roman" panose="02020603050405020304" pitchFamily="18" charset="0"/>
+            </a:endParaRPr>
+          </a:p>
+          <a:p>
+            <a:pPr marL="1143000" lvl="2" indent="-228600">
+              <a:lnSpc>
+                <a:spcPct val="107000"/>
+              </a:lnSpc>
+              <a:spcAft>
+                <a:spcPts val="0"/>
+              </a:spcAft>
+              <a:buFont typeface="Wingdings" panose="05000000000000000000" pitchFamily="2" charset="2"/>
+              <a:buChar char=""/>
+            </a:pPr>
+            <a:r>
+              <a:rPr lang="en-US" dirty="0">
+                <a:latin typeface="Calibri" panose="020F0502020204030204" pitchFamily="34" charset="0"/>
+                <a:ea typeface="Calibri" panose="020F0502020204030204" pitchFamily="34" charset="0"/>
+                <a:cs typeface="Times New Roman" panose="02020603050405020304" pitchFamily="18" charset="0"/>
+              </a:rPr>
+              <a:t>System prompts the user for a username.</a:t>
+            </a:r>
+            <a:endParaRPr lang="en-US" sz="1050" dirty="0">
+              <a:latin typeface="Calibri" panose="020F0502020204030204" pitchFamily="34" charset="0"/>
+              <a:ea typeface="Calibri" panose="020F0502020204030204" pitchFamily="34" charset="0"/>
+              <a:cs typeface="Times New Roman" panose="02020603050405020304" pitchFamily="18" charset="0"/>
+            </a:endParaRPr>
+          </a:p>
+          <a:p>
+            <a:pPr marL="1143000" lvl="2" indent="-228600">
+              <a:lnSpc>
+                <a:spcPct val="107000"/>
+              </a:lnSpc>
+              <a:spcAft>
+                <a:spcPts val="0"/>
+              </a:spcAft>
+              <a:buFont typeface="Wingdings" panose="05000000000000000000" pitchFamily="2" charset="2"/>
+              <a:buChar char=""/>
+            </a:pPr>
+            <a:r>
+              <a:rPr lang="en-US" dirty="0">
+                <a:latin typeface="Calibri" panose="020F0502020204030204" pitchFamily="34" charset="0"/>
+                <a:ea typeface="Calibri" panose="020F0502020204030204" pitchFamily="34" charset="0"/>
+                <a:cs typeface="Times New Roman" panose="02020603050405020304" pitchFamily="18" charset="0"/>
+              </a:rPr>
+              <a:t>Customer Provides a valid username.</a:t>
+            </a:r>
+            <a:endParaRPr lang="en-US" sz="1050" dirty="0">
+              <a:latin typeface="Calibri" panose="020F0502020204030204" pitchFamily="34" charset="0"/>
+              <a:ea typeface="Calibri" panose="020F0502020204030204" pitchFamily="34" charset="0"/>
+              <a:cs typeface="Times New Roman" panose="02020603050405020304" pitchFamily="18" charset="0"/>
+            </a:endParaRPr>
+          </a:p>
+          <a:p>
+            <a:pPr marL="1143000" lvl="2" indent="-228600">
+              <a:lnSpc>
+                <a:spcPct val="107000"/>
+              </a:lnSpc>
+              <a:spcAft>
+                <a:spcPts val="0"/>
+              </a:spcAft>
+              <a:buFont typeface="Wingdings" panose="05000000000000000000" pitchFamily="2" charset="2"/>
+              <a:buChar char=""/>
+            </a:pPr>
+            <a:r>
+              <a:rPr lang="en-US" dirty="0">
+                <a:latin typeface="Calibri" panose="020F0502020204030204" pitchFamily="34" charset="0"/>
+                <a:ea typeface="Calibri" panose="020F0502020204030204" pitchFamily="34" charset="0"/>
+                <a:cs typeface="Times New Roman" panose="02020603050405020304" pitchFamily="18" charset="0"/>
+              </a:rPr>
+              <a:t>System prompts the user for a password.</a:t>
+            </a:r>
+            <a:endParaRPr lang="en-US" sz="1050" dirty="0">
+              <a:latin typeface="Calibri" panose="020F0502020204030204" pitchFamily="34" charset="0"/>
+              <a:ea typeface="Calibri" panose="020F0502020204030204" pitchFamily="34" charset="0"/>
+              <a:cs typeface="Times New Roman" panose="02020603050405020304" pitchFamily="18" charset="0"/>
+            </a:endParaRPr>
+          </a:p>
+          <a:p>
+            <a:pPr marL="1143000" lvl="2" indent="-228600">
+              <a:lnSpc>
+                <a:spcPct val="107000"/>
+              </a:lnSpc>
+              <a:spcAft>
+                <a:spcPts val="0"/>
+              </a:spcAft>
+              <a:buFont typeface="Wingdings" panose="05000000000000000000" pitchFamily="2" charset="2"/>
+              <a:buChar char=""/>
+            </a:pPr>
+            <a:r>
+              <a:rPr lang="en-US" dirty="0">
+                <a:latin typeface="Calibri" panose="020F0502020204030204" pitchFamily="34" charset="0"/>
+                <a:ea typeface="Calibri" panose="020F0502020204030204" pitchFamily="34" charset="0"/>
+                <a:cs typeface="Times New Roman" panose="02020603050405020304" pitchFamily="18" charset="0"/>
+              </a:rPr>
+              <a:t>Customer Provides a valid password.</a:t>
+            </a:r>
+            <a:endParaRPr lang="en-US" sz="1050" dirty="0">
+              <a:latin typeface="Calibri" panose="020F0502020204030204" pitchFamily="34" charset="0"/>
+              <a:ea typeface="Calibri" panose="020F0502020204030204" pitchFamily="34" charset="0"/>
+              <a:cs typeface="Times New Roman" panose="02020603050405020304" pitchFamily="18" charset="0"/>
+            </a:endParaRPr>
+          </a:p>
+          <a:p>
+            <a:pPr marL="1143000" lvl="2" indent="-228600">
+              <a:lnSpc>
+                <a:spcPct val="107000"/>
+              </a:lnSpc>
+              <a:spcAft>
+                <a:spcPts val="0"/>
+              </a:spcAft>
+              <a:buFont typeface="Wingdings" panose="05000000000000000000" pitchFamily="2" charset="2"/>
+              <a:buChar char=""/>
+            </a:pPr>
+            <a:r>
+              <a:rPr lang="en-US" dirty="0">
+                <a:latin typeface="Calibri" panose="020F0502020204030204" pitchFamily="34" charset="0"/>
+                <a:ea typeface="Calibri" panose="020F0502020204030204" pitchFamily="34" charset="0"/>
+                <a:cs typeface="Times New Roman" panose="02020603050405020304" pitchFamily="18" charset="0"/>
+              </a:rPr>
+              <a:t>System prompts the user for an optional email.</a:t>
+            </a:r>
+            <a:endParaRPr lang="en-US" sz="1050" dirty="0">
+              <a:latin typeface="Calibri" panose="020F0502020204030204" pitchFamily="34" charset="0"/>
+              <a:ea typeface="Calibri" panose="020F0502020204030204" pitchFamily="34" charset="0"/>
+              <a:cs typeface="Times New Roman" panose="02020603050405020304" pitchFamily="18" charset="0"/>
+            </a:endParaRPr>
+          </a:p>
+          <a:p>
+            <a:pPr marL="1143000" lvl="2" indent="-228600">
+              <a:lnSpc>
+                <a:spcPct val="107000"/>
+              </a:lnSpc>
+              <a:spcAft>
+                <a:spcPts val="0"/>
+              </a:spcAft>
+              <a:buFont typeface="Wingdings" panose="05000000000000000000" pitchFamily="2" charset="2"/>
+              <a:buChar char=""/>
+            </a:pPr>
+            <a:r>
+              <a:rPr lang="en-US" dirty="0">
+                <a:latin typeface="Calibri" panose="020F0502020204030204" pitchFamily="34" charset="0"/>
+                <a:ea typeface="Calibri" panose="020F0502020204030204" pitchFamily="34" charset="0"/>
+                <a:cs typeface="Times New Roman" panose="02020603050405020304" pitchFamily="18" charset="0"/>
+              </a:rPr>
+              <a:t>Customer supplies a valid email address.</a:t>
+            </a:r>
+            <a:endParaRPr lang="en-US" sz="1050" dirty="0">
+              <a:latin typeface="Calibri" panose="020F0502020204030204" pitchFamily="34" charset="0"/>
+              <a:ea typeface="Calibri" panose="020F0502020204030204" pitchFamily="34" charset="0"/>
+              <a:cs typeface="Times New Roman" panose="02020603050405020304" pitchFamily="18" charset="0"/>
+            </a:endParaRPr>
+          </a:p>
+          <a:p>
+            <a:pPr marL="1143000" lvl="2" indent="-228600">
+              <a:lnSpc>
+                <a:spcPct val="107000"/>
+              </a:lnSpc>
+              <a:spcAft>
+                <a:spcPts val="0"/>
+              </a:spcAft>
+              <a:buFont typeface="Wingdings" panose="05000000000000000000" pitchFamily="2" charset="2"/>
+              <a:buChar char=""/>
+            </a:pPr>
+            <a:r>
+              <a:rPr lang="en-US" dirty="0">
+                <a:latin typeface="Calibri" panose="020F0502020204030204" pitchFamily="34" charset="0"/>
+                <a:ea typeface="Calibri" panose="020F0502020204030204" pitchFamily="34" charset="0"/>
+                <a:cs typeface="Times New Roman" panose="02020603050405020304" pitchFamily="18" charset="0"/>
+              </a:rPr>
+              <a:t>System prompts the user for Date of Birth (DOB).</a:t>
+            </a:r>
+            <a:endParaRPr lang="en-US" sz="1050" dirty="0">
+              <a:latin typeface="Calibri" panose="020F0502020204030204" pitchFamily="34" charset="0"/>
+              <a:ea typeface="Calibri" panose="020F0502020204030204" pitchFamily="34" charset="0"/>
+              <a:cs typeface="Times New Roman" panose="02020603050405020304" pitchFamily="18" charset="0"/>
+            </a:endParaRPr>
+          </a:p>
+          <a:p>
+            <a:pPr marL="1143000" lvl="2" indent="-228600">
+              <a:lnSpc>
+                <a:spcPct val="107000"/>
+              </a:lnSpc>
+              <a:spcAft>
+                <a:spcPts val="0"/>
+              </a:spcAft>
+              <a:buFont typeface="Wingdings" panose="05000000000000000000" pitchFamily="2" charset="2"/>
+              <a:buChar char=""/>
+            </a:pPr>
+            <a:r>
+              <a:rPr lang="en-US" dirty="0">
+                <a:latin typeface="Calibri" panose="020F0502020204030204" pitchFamily="34" charset="0"/>
+                <a:ea typeface="Calibri" panose="020F0502020204030204" pitchFamily="34" charset="0"/>
+                <a:cs typeface="Times New Roman" panose="02020603050405020304" pitchFamily="18" charset="0"/>
+              </a:rPr>
+              <a:t>Customer Provides correct DOB.</a:t>
+            </a:r>
+            <a:endParaRPr lang="en-US" sz="1050" dirty="0">
+              <a:latin typeface="Calibri" panose="020F0502020204030204" pitchFamily="34" charset="0"/>
+              <a:ea typeface="Calibri" panose="020F0502020204030204" pitchFamily="34" charset="0"/>
+              <a:cs typeface="Times New Roman" panose="02020603050405020304" pitchFamily="18" charset="0"/>
+            </a:endParaRPr>
+          </a:p>
+          <a:p>
+            <a:pPr marL="1143000" lvl="2" indent="-228600">
+              <a:lnSpc>
+                <a:spcPct val="107000"/>
+              </a:lnSpc>
+              <a:spcAft>
+                <a:spcPts val="0"/>
+              </a:spcAft>
+              <a:buFont typeface="Wingdings" panose="05000000000000000000" pitchFamily="2" charset="2"/>
+              <a:buChar char=""/>
+            </a:pPr>
+            <a:r>
+              <a:rPr lang="en-US" dirty="0">
+                <a:latin typeface="Calibri" panose="020F0502020204030204" pitchFamily="34" charset="0"/>
+                <a:ea typeface="Calibri" panose="020F0502020204030204" pitchFamily="34" charset="0"/>
+                <a:cs typeface="Times New Roman" panose="02020603050405020304" pitchFamily="18" charset="0"/>
+              </a:rPr>
+              <a:t>System prompts the user with these required fields: Address, Zip, Phone Number, City, State, and SSN.</a:t>
+            </a:r>
+            <a:endParaRPr lang="en-US" sz="1050" dirty="0">
+              <a:latin typeface="Calibri" panose="020F0502020204030204" pitchFamily="34" charset="0"/>
+              <a:ea typeface="Calibri" panose="020F0502020204030204" pitchFamily="34" charset="0"/>
+              <a:cs typeface="Times New Roman" panose="02020603050405020304" pitchFamily="18" charset="0"/>
+            </a:endParaRPr>
+          </a:p>
+          <a:p>
+            <a:pPr marL="1143000" lvl="2" indent="-228600">
+              <a:lnSpc>
+                <a:spcPct val="107000"/>
+              </a:lnSpc>
+              <a:spcAft>
+                <a:spcPts val="0"/>
+              </a:spcAft>
+              <a:buFont typeface="Wingdings" panose="05000000000000000000" pitchFamily="2" charset="2"/>
+              <a:buChar char=""/>
+            </a:pPr>
+            <a:r>
+              <a:rPr lang="en-US" dirty="0">
+                <a:latin typeface="Calibri" panose="020F0502020204030204" pitchFamily="34" charset="0"/>
+                <a:ea typeface="Calibri" panose="020F0502020204030204" pitchFamily="34" charset="0"/>
+                <a:cs typeface="Times New Roman" panose="02020603050405020304" pitchFamily="18" charset="0"/>
+              </a:rPr>
+              <a:t>Customer Provides correct information.</a:t>
+            </a:r>
+            <a:endParaRPr lang="en-US" sz="1050" dirty="0">
+              <a:latin typeface="Calibri" panose="020F0502020204030204" pitchFamily="34" charset="0"/>
+              <a:ea typeface="Calibri" panose="020F0502020204030204" pitchFamily="34" charset="0"/>
+              <a:cs typeface="Times New Roman" panose="02020603050405020304" pitchFamily="18" charset="0"/>
+            </a:endParaRPr>
+          </a:p>
+          <a:p>
+            <a:pPr marL="1143000" lvl="2" indent="-228600">
+              <a:lnSpc>
+                <a:spcPct val="107000"/>
+              </a:lnSpc>
+              <a:spcAft>
+                <a:spcPts val="0"/>
+              </a:spcAft>
+              <a:buFont typeface="Wingdings" panose="05000000000000000000" pitchFamily="2" charset="2"/>
+              <a:buChar char=""/>
+            </a:pPr>
+            <a:r>
+              <a:rPr lang="en-US" dirty="0">
+                <a:latin typeface="Calibri" panose="020F0502020204030204" pitchFamily="34" charset="0"/>
+                <a:ea typeface="Calibri" panose="020F0502020204030204" pitchFamily="34" charset="0"/>
+                <a:cs typeface="Times New Roman" panose="02020603050405020304" pitchFamily="18" charset="0"/>
+              </a:rPr>
+              <a:t>System checks to see if all required fields are filled in. (* is a required field).</a:t>
+            </a:r>
+            <a:endParaRPr lang="en-US" sz="1050" dirty="0">
+              <a:latin typeface="Calibri" panose="020F0502020204030204" pitchFamily="34" charset="0"/>
+              <a:ea typeface="Calibri" panose="020F0502020204030204" pitchFamily="34" charset="0"/>
+              <a:cs typeface="Times New Roman" panose="02020603050405020304" pitchFamily="18" charset="0"/>
+            </a:endParaRPr>
+          </a:p>
+          <a:p>
+            <a:pPr marL="1143000" lvl="2" indent="-228600">
+              <a:lnSpc>
+                <a:spcPct val="107000"/>
+              </a:lnSpc>
+              <a:spcAft>
+                <a:spcPts val="0"/>
+              </a:spcAft>
+              <a:buFont typeface="Wingdings" panose="05000000000000000000" pitchFamily="2" charset="2"/>
+              <a:buChar char=""/>
+            </a:pPr>
+            <a:r>
+              <a:rPr lang="en-US" dirty="0">
+                <a:latin typeface="Calibri" panose="020F0502020204030204" pitchFamily="34" charset="0"/>
+                <a:ea typeface="Calibri" panose="020F0502020204030204" pitchFamily="34" charset="0"/>
+                <a:cs typeface="Times New Roman" panose="02020603050405020304" pitchFamily="18" charset="0"/>
+              </a:rPr>
+              <a:t>System checks for unique usernames and passwords to see if they already have been used.</a:t>
+            </a:r>
+            <a:endParaRPr lang="en-US" sz="1050" dirty="0">
+              <a:latin typeface="Calibri" panose="020F0502020204030204" pitchFamily="34" charset="0"/>
+              <a:ea typeface="Calibri" panose="020F0502020204030204" pitchFamily="34" charset="0"/>
+              <a:cs typeface="Times New Roman" panose="02020603050405020304" pitchFamily="18" charset="0"/>
+            </a:endParaRPr>
+          </a:p>
+          <a:p>
+            <a:pPr marL="1143000" lvl="2" indent="-228600">
+              <a:lnSpc>
+                <a:spcPct val="107000"/>
+              </a:lnSpc>
+              <a:spcAft>
+                <a:spcPts val="0"/>
+              </a:spcAft>
+              <a:buFont typeface="Wingdings" panose="05000000000000000000" pitchFamily="2" charset="2"/>
+              <a:buChar char=""/>
+            </a:pPr>
+            <a:r>
+              <a:rPr lang="en-US" dirty="0">
+                <a:latin typeface="Calibri" panose="020F0502020204030204" pitchFamily="34" charset="0"/>
+                <a:ea typeface="Calibri" panose="020F0502020204030204" pitchFamily="34" charset="0"/>
+                <a:cs typeface="Times New Roman" panose="02020603050405020304" pitchFamily="18" charset="0"/>
+              </a:rPr>
+              <a:t>Saves users credentials to the database if valid.</a:t>
+            </a:r>
+            <a:endParaRPr lang="en-US" sz="1050" dirty="0">
+              <a:latin typeface="Calibri" panose="020F0502020204030204" pitchFamily="34" charset="0"/>
+              <a:ea typeface="Calibri" panose="020F0502020204030204" pitchFamily="34" charset="0"/>
+              <a:cs typeface="Times New Roman" panose="02020603050405020304" pitchFamily="18" charset="0"/>
+            </a:endParaRPr>
+          </a:p>
+          <a:p>
+            <a:pPr marL="1143000" lvl="2" indent="-228600">
+              <a:lnSpc>
+                <a:spcPct val="107000"/>
+              </a:lnSpc>
+              <a:spcAft>
+                <a:spcPts val="0"/>
+              </a:spcAft>
+              <a:buFont typeface="Wingdings" panose="05000000000000000000" pitchFamily="2" charset="2"/>
+              <a:buChar char=""/>
+            </a:pPr>
+            <a:r>
+              <a:rPr lang="en-US" dirty="0">
+                <a:latin typeface="Calibri" panose="020F0502020204030204" pitchFamily="34" charset="0"/>
+                <a:ea typeface="Calibri" panose="020F0502020204030204" pitchFamily="34" charset="0"/>
+                <a:cs typeface="Times New Roman" panose="02020603050405020304" pitchFamily="18" charset="0"/>
+              </a:rPr>
+              <a:t>Customers press the “Submit” Button to confirm.</a:t>
+            </a:r>
+            <a:endParaRPr lang="en-US" sz="1050" dirty="0">
+              <a:latin typeface="Calibri" panose="020F0502020204030204" pitchFamily="34" charset="0"/>
+              <a:ea typeface="Calibri" panose="020F0502020204030204" pitchFamily="34" charset="0"/>
+              <a:cs typeface="Times New Roman" panose="02020603050405020304" pitchFamily="18" charset="0"/>
+            </a:endParaRPr>
+          </a:p>
+          <a:p>
+            <a:pPr marL="1143000" lvl="2" indent="-228600">
+              <a:lnSpc>
+                <a:spcPct val="107000"/>
+              </a:lnSpc>
+              <a:spcAft>
+                <a:spcPts val="0"/>
+              </a:spcAft>
+              <a:buFont typeface="Wingdings" panose="05000000000000000000" pitchFamily="2" charset="2"/>
+              <a:buChar char=""/>
+            </a:pPr>
+            <a:r>
+              <a:rPr lang="en-US" dirty="0">
+                <a:latin typeface="Calibri" panose="020F0502020204030204" pitchFamily="34" charset="0"/>
+                <a:ea typeface="Calibri" panose="020F0502020204030204" pitchFamily="34" charset="0"/>
+                <a:cs typeface="Times New Roman" panose="02020603050405020304" pitchFamily="18" charset="0"/>
+              </a:rPr>
+              <a:t>System notifies user via email that their account was successfully created.</a:t>
+            </a:r>
+            <a:endParaRPr lang="en-US" sz="1050" dirty="0">
+              <a:latin typeface="Calibri" panose="020F0502020204030204" pitchFamily="34" charset="0"/>
+              <a:ea typeface="Calibri" panose="020F0502020204030204" pitchFamily="34" charset="0"/>
+              <a:cs typeface="Times New Roman" panose="02020603050405020304" pitchFamily="18" charset="0"/>
+            </a:endParaRPr>
+          </a:p>
+          <a:p>
+            <a:pPr marL="742950" lvl="1" indent="-285750">
+              <a:lnSpc>
+                <a:spcPct val="107000"/>
+              </a:lnSpc>
+              <a:spcAft>
+                <a:spcPts val="0"/>
+              </a:spcAft>
+              <a:buFont typeface="Courier New" panose="02070309020205020404" pitchFamily="49" charset="0"/>
+              <a:buChar char="o"/>
+            </a:pPr>
+            <a:r>
+              <a:rPr lang="en-US" b="1" dirty="0">
+                <a:latin typeface="Calibri" panose="020F0502020204030204" pitchFamily="34" charset="0"/>
+                <a:ea typeface="Calibri" panose="020F0502020204030204" pitchFamily="34" charset="0"/>
+                <a:cs typeface="Times New Roman" panose="02020603050405020304" pitchFamily="18" charset="0"/>
+              </a:rPr>
+              <a:t>Alternate flows:</a:t>
+            </a:r>
+            <a:endParaRPr lang="en-US" sz="1050" dirty="0">
+              <a:latin typeface="Calibri" panose="020F0502020204030204" pitchFamily="34" charset="0"/>
+              <a:ea typeface="Calibri" panose="020F0502020204030204" pitchFamily="34" charset="0"/>
+              <a:cs typeface="Times New Roman" panose="02020603050405020304" pitchFamily="18" charset="0"/>
+            </a:endParaRPr>
+          </a:p>
+          <a:p>
+            <a:pPr marL="1143000" lvl="2" indent="-228600">
+              <a:lnSpc>
+                <a:spcPct val="107000"/>
+              </a:lnSpc>
+              <a:spcAft>
+                <a:spcPts val="0"/>
+              </a:spcAft>
+              <a:buFont typeface="Wingdings" panose="05000000000000000000" pitchFamily="2" charset="2"/>
+              <a:buChar char=""/>
+            </a:pPr>
+            <a:r>
+              <a:rPr lang="en-US" dirty="0">
+                <a:latin typeface="Calibri" panose="020F0502020204030204" pitchFamily="34" charset="0"/>
+                <a:ea typeface="Calibri" panose="020F0502020204030204" pitchFamily="34" charset="0"/>
+                <a:cs typeface="Times New Roman" panose="02020603050405020304" pitchFamily="18" charset="0"/>
+              </a:rPr>
+              <a:t>System check discovers fixable deficiency: The user discovers a problem with connecting to Wi-Fi, but can fix it by powering the modem/ router down.</a:t>
+            </a:r>
+            <a:endParaRPr lang="en-US" sz="1050" dirty="0">
+              <a:latin typeface="Calibri" panose="020F0502020204030204" pitchFamily="34" charset="0"/>
+              <a:ea typeface="Calibri" panose="020F0502020204030204" pitchFamily="34" charset="0"/>
+              <a:cs typeface="Times New Roman" panose="02020603050405020304" pitchFamily="18" charset="0"/>
+            </a:endParaRPr>
+          </a:p>
+          <a:p>
+            <a:pPr marL="1143000" lvl="2" indent="-228600">
+              <a:lnSpc>
+                <a:spcPct val="107000"/>
+              </a:lnSpc>
+              <a:spcAft>
+                <a:spcPts val="0"/>
+              </a:spcAft>
+              <a:buFont typeface="Wingdings" panose="05000000000000000000" pitchFamily="2" charset="2"/>
+              <a:buChar char=""/>
+            </a:pPr>
+            <a:r>
+              <a:rPr lang="en-US" dirty="0">
+                <a:latin typeface="Calibri" panose="020F0502020204030204" pitchFamily="34" charset="0"/>
+                <a:ea typeface="Calibri" panose="020F0502020204030204" pitchFamily="34" charset="0"/>
+                <a:cs typeface="Times New Roman" panose="02020603050405020304" pitchFamily="18" charset="0"/>
+              </a:rPr>
+              <a:t>Button malfunction: The register button doesn’t operate as it’s supposed to, admins can fix it in a timely manner. (allowing users to continue registration).</a:t>
+            </a:r>
+            <a:endParaRPr lang="en-US" sz="1050" dirty="0">
+              <a:latin typeface="Calibri" panose="020F0502020204030204" pitchFamily="34" charset="0"/>
+              <a:ea typeface="Calibri" panose="020F0502020204030204" pitchFamily="34" charset="0"/>
+              <a:cs typeface="Times New Roman" panose="02020603050405020304" pitchFamily="18" charset="0"/>
+            </a:endParaRPr>
+          </a:p>
+          <a:p>
+            <a:pPr marL="1143000" lvl="2" indent="-228600">
+              <a:lnSpc>
+                <a:spcPct val="107000"/>
+              </a:lnSpc>
+              <a:spcAft>
+                <a:spcPts val="800"/>
+              </a:spcAft>
+              <a:buFont typeface="Wingdings" panose="05000000000000000000" pitchFamily="2" charset="2"/>
+              <a:buChar char=""/>
+            </a:pPr>
+            <a:r>
+              <a:rPr lang="en-US" dirty="0">
+                <a:latin typeface="Calibri" panose="020F0502020204030204" pitchFamily="34" charset="0"/>
+                <a:ea typeface="Calibri" panose="020F0502020204030204" pitchFamily="34" charset="0"/>
+                <a:cs typeface="Times New Roman" panose="02020603050405020304" pitchFamily="18" charset="0"/>
+              </a:rPr>
+              <a:t>Failed to register: The credentials entered failed. The user must make sure all the required fields are filled out. ( * indicates a required field).</a:t>
+            </a:r>
+            <a:endParaRPr lang="en-US" sz="1050" dirty="0">
+              <a:latin typeface="Calibri" panose="020F0502020204030204" pitchFamily="34" charset="0"/>
+              <a:ea typeface="Calibri" panose="020F0502020204030204" pitchFamily="34" charset="0"/>
+              <a:cs typeface="Times New Roman" panose="02020603050405020304" pitchFamily="18" charset="0"/>
+            </a:endParaRPr>
+          </a:p>
+          <a:p>
+            <a:pPr marL="1143000" lvl="2" indent="-228600">
+              <a:lnSpc>
+                <a:spcPct val="107000"/>
+              </a:lnSpc>
+              <a:spcAft>
+                <a:spcPts val="800"/>
+              </a:spcAft>
+              <a:buFont typeface="Wingdings" panose="05000000000000000000" pitchFamily="2" charset="2"/>
+              <a:buChar char=""/>
+            </a:pPr>
+            <a:endParaRPr lang="en-US" sz="1050" dirty="0" smtClean="0">
+              <a:latin typeface="Calibri" panose="020F0502020204030204" pitchFamily="34" charset="0"/>
+              <a:ea typeface="Calibri" panose="020F0502020204030204" pitchFamily="34" charset="0"/>
+              <a:cs typeface="Times New Roman" panose="02020603050405020304" pitchFamily="18" charset="0"/>
+            </a:endParaRPr>
+          </a:p>
+          <a:p>
+            <a:endParaRPr lang="en-US" dirty="0"/>
+          </a:p>
+        </p:txBody>
+      </p:sp>
+    </p:spTree>
+    <p:extLst>
+      <p:ext uri="{BB962C8B-B14F-4D97-AF65-F5344CB8AC3E}">
+        <p14:creationId xmlns:p14="http://schemas.microsoft.com/office/powerpoint/2010/main" val="4210874503"/>
+      </p:ext>
+    </p:extLst>
+  </p:cSld>
+  <p:clrMapOvr>
+    <a:masterClrMapping/>
+  </p:clrMapOvr>
+  <p:timing>
+    <p:tnLst>
+      <p:par>
+        <p:cTn id="1" dur="indefinite" restart="never" nodeType="tmRoot"/>
+      </p:par>
+    </p:tnLst>
+  </p:timing>
+</p:sld>
+</file>
+
+<file path=ppt/slides/slide6.xml><?xml version="1.0" encoding="utf-8"?>
+<p:sld xmlns:a="http://schemas.openxmlformats.org/drawingml/2006/main" xmlns:r="http://schemas.openxmlformats.org/officeDocument/2006/relationships" xmlns:p="http://schemas.openxmlformats.org/presentationml/2006/main">
+  <p:cSld>
+    <p:spTree>
+      <p:nvGrpSpPr>
+        <p:cNvPr id="1" name=""/>
+        <p:cNvGrpSpPr/>
+        <p:nvPr/>
+      </p:nvGrpSpPr>
+      <p:grpSpPr>
+        <a:xfrm>
+          <a:off x="0" y="0"/>
+          <a:ext cx="0" cy="0"/>
+          <a:chOff x="0" y="0"/>
+          <a:chExt cx="0" cy="0"/>
+        </a:xfrm>
+      </p:grpSpPr>
+      <p:sp>
+        <p:nvSpPr>
+          <p:cNvPr id="2" name="Title 1"/>
+          <p:cNvSpPr>
+            <a:spLocks noGrp="1"/>
+          </p:cNvSpPr>
+          <p:nvPr>
+            <p:ph type="title"/>
+          </p:nvPr>
+        </p:nvSpPr>
+        <p:spPr/>
+        <p:txBody>
+          <a:bodyPr/>
+          <a:lstStyle/>
+          <a:p>
+            <a:r>
+              <a:rPr lang="en-US" dirty="0" smtClean="0"/>
+              <a:t>Use </a:t>
+            </a:r>
+            <a:r>
+              <a:rPr lang="en-US" dirty="0"/>
+              <a:t>Case UC – 2: Login into Account</a:t>
+            </a:r>
+          </a:p>
+        </p:txBody>
+      </p:sp>
+      <p:sp>
+        <p:nvSpPr>
+          <p:cNvPr id="3" name="Text Placeholder 2"/>
+          <p:cNvSpPr>
+            <a:spLocks noGrp="1"/>
+          </p:cNvSpPr>
+          <p:nvPr>
+            <p:ph type="body" idx="1"/>
+          </p:nvPr>
+        </p:nvSpPr>
+        <p:spPr>
+          <a:xfrm>
+            <a:off x="1297500" y="1307850"/>
+            <a:ext cx="7038900" cy="3575950"/>
+          </a:xfrm>
+        </p:spPr>
+        <p:txBody>
+          <a:bodyPr/>
+          <a:lstStyle/>
+          <a:p>
+            <a:pPr marL="1143000" lvl="2" indent="-228600">
+              <a:lnSpc>
+                <a:spcPct val="107000"/>
+              </a:lnSpc>
+              <a:spcAft>
+                <a:spcPts val="800"/>
+              </a:spcAft>
+              <a:buFont typeface="Wingdings" panose="05000000000000000000" pitchFamily="2" charset="2"/>
+              <a:buChar char=""/>
+            </a:pPr>
+            <a:endParaRPr lang="en-US" sz="1050" dirty="0" smtClean="0">
+              <a:latin typeface="Calibri" panose="020F0502020204030204" pitchFamily="34" charset="0"/>
+              <a:ea typeface="Calibri" panose="020F0502020204030204" pitchFamily="34" charset="0"/>
+              <a:cs typeface="Times New Roman" panose="02020603050405020304" pitchFamily="18" charset="0"/>
+            </a:endParaRPr>
+          </a:p>
+          <a:p>
+            <a:pPr marL="742950" lvl="1" indent="-285750">
+              <a:lnSpc>
+                <a:spcPct val="107000"/>
+              </a:lnSpc>
+              <a:spcAft>
+                <a:spcPts val="0"/>
+              </a:spcAft>
+              <a:buFont typeface="Courier New" panose="02070309020205020404" pitchFamily="49" charset="0"/>
+              <a:buChar char="o"/>
+            </a:pPr>
+            <a:r>
+              <a:rPr lang="en-US" b="1" dirty="0">
+                <a:latin typeface="Calibri" panose="020F0502020204030204" pitchFamily="34" charset="0"/>
+                <a:ea typeface="Calibri" panose="020F0502020204030204" pitchFamily="34" charset="0"/>
+                <a:cs typeface="Times New Roman" panose="02020603050405020304" pitchFamily="18" charset="0"/>
+              </a:rPr>
+              <a:t>Summary:</a:t>
+            </a:r>
+            <a:endParaRPr lang="en-US" sz="1050" dirty="0">
+              <a:latin typeface="Calibri" panose="020F0502020204030204" pitchFamily="34" charset="0"/>
+              <a:ea typeface="Calibri" panose="020F0502020204030204" pitchFamily="34" charset="0"/>
+              <a:cs typeface="Times New Roman" panose="02020603050405020304" pitchFamily="18" charset="0"/>
+            </a:endParaRPr>
+          </a:p>
+          <a:p>
+            <a:pPr marL="1143000" lvl="2" indent="-228600">
+              <a:lnSpc>
+                <a:spcPct val="107000"/>
+              </a:lnSpc>
+              <a:spcAft>
+                <a:spcPts val="0"/>
+              </a:spcAft>
+              <a:buFont typeface="Wingdings" panose="05000000000000000000" pitchFamily="2" charset="2"/>
+              <a:buChar char=""/>
+            </a:pPr>
+            <a:r>
+              <a:rPr lang="en-US" dirty="0">
+                <a:latin typeface="Calibri" panose="020F0502020204030204" pitchFamily="34" charset="0"/>
+                <a:ea typeface="Calibri" panose="020F0502020204030204" pitchFamily="34" charset="0"/>
+                <a:cs typeface="Times New Roman" panose="02020603050405020304" pitchFamily="18" charset="0"/>
+              </a:rPr>
+              <a:t>This use case is designed for users who already made an account. In this case, A user will click on “Sign in” to access their account. When users access their account, they will gain different permissions than someone who hasn’t made an account. The user will gain access to buying items and setting rink date/times and possibly more.</a:t>
+            </a:r>
+            <a:endParaRPr lang="en-US" sz="1050" dirty="0">
+              <a:latin typeface="Calibri" panose="020F0502020204030204" pitchFamily="34" charset="0"/>
+              <a:ea typeface="Calibri" panose="020F0502020204030204" pitchFamily="34" charset="0"/>
+              <a:cs typeface="Times New Roman" panose="02020603050405020304" pitchFamily="18" charset="0"/>
+            </a:endParaRPr>
+          </a:p>
+          <a:p>
+            <a:pPr marL="742950" lvl="1" indent="-285750">
+              <a:lnSpc>
+                <a:spcPct val="107000"/>
+              </a:lnSpc>
+              <a:spcAft>
+                <a:spcPts val="0"/>
+              </a:spcAft>
+              <a:buFont typeface="Courier New" panose="02070309020205020404" pitchFamily="49" charset="0"/>
+              <a:buChar char="o"/>
+            </a:pPr>
+            <a:r>
+              <a:rPr lang="en-US" b="1" dirty="0">
+                <a:latin typeface="Calibri" panose="020F0502020204030204" pitchFamily="34" charset="0"/>
+                <a:ea typeface="Calibri" panose="020F0502020204030204" pitchFamily="34" charset="0"/>
+                <a:cs typeface="Times New Roman" panose="02020603050405020304" pitchFamily="18" charset="0"/>
+              </a:rPr>
+              <a:t>Initiating Actors(s):</a:t>
+            </a:r>
+            <a:endParaRPr lang="en-US" sz="1050" dirty="0">
+              <a:latin typeface="Calibri" panose="020F0502020204030204" pitchFamily="34" charset="0"/>
+              <a:ea typeface="Calibri" panose="020F0502020204030204" pitchFamily="34" charset="0"/>
+              <a:cs typeface="Times New Roman" panose="02020603050405020304" pitchFamily="18" charset="0"/>
+            </a:endParaRPr>
+          </a:p>
+          <a:p>
+            <a:pPr marL="1143000" lvl="2" indent="-228600">
+              <a:lnSpc>
+                <a:spcPct val="107000"/>
+              </a:lnSpc>
+              <a:spcAft>
+                <a:spcPts val="0"/>
+              </a:spcAft>
+              <a:buFont typeface="Wingdings" panose="05000000000000000000" pitchFamily="2" charset="2"/>
+              <a:buChar char=""/>
+            </a:pPr>
+            <a:r>
+              <a:rPr lang="en-US" dirty="0">
+                <a:latin typeface="Calibri" panose="020F0502020204030204" pitchFamily="34" charset="0"/>
+                <a:ea typeface="Calibri" panose="020F0502020204030204" pitchFamily="34" charset="0"/>
+                <a:cs typeface="Times New Roman" panose="02020603050405020304" pitchFamily="18" charset="0"/>
+              </a:rPr>
+              <a:t>Customer</a:t>
+            </a:r>
+            <a:endParaRPr lang="en-US" sz="1050" dirty="0">
+              <a:latin typeface="Calibri" panose="020F0502020204030204" pitchFamily="34" charset="0"/>
+              <a:ea typeface="Calibri" panose="020F0502020204030204" pitchFamily="34" charset="0"/>
+              <a:cs typeface="Times New Roman" panose="02020603050405020304" pitchFamily="18" charset="0"/>
+            </a:endParaRPr>
+          </a:p>
+          <a:p>
+            <a:pPr marL="1143000" lvl="2" indent="-228600">
+              <a:lnSpc>
+                <a:spcPct val="107000"/>
+              </a:lnSpc>
+              <a:spcAft>
+                <a:spcPts val="0"/>
+              </a:spcAft>
+              <a:buFont typeface="Wingdings" panose="05000000000000000000" pitchFamily="2" charset="2"/>
+              <a:buChar char=""/>
+            </a:pPr>
+            <a:r>
+              <a:rPr lang="en-US" dirty="0">
+                <a:latin typeface="Calibri" panose="020F0502020204030204" pitchFamily="34" charset="0"/>
+                <a:ea typeface="Calibri" panose="020F0502020204030204" pitchFamily="34" charset="0"/>
+                <a:cs typeface="Times New Roman" panose="02020603050405020304" pitchFamily="18" charset="0"/>
+              </a:rPr>
+              <a:t>Employee</a:t>
+            </a:r>
+            <a:endParaRPr lang="en-US" sz="1050" dirty="0">
+              <a:latin typeface="Calibri" panose="020F0502020204030204" pitchFamily="34" charset="0"/>
+              <a:ea typeface="Calibri" panose="020F0502020204030204" pitchFamily="34" charset="0"/>
+              <a:cs typeface="Times New Roman" panose="02020603050405020304" pitchFamily="18" charset="0"/>
+            </a:endParaRPr>
+          </a:p>
+          <a:p>
+            <a:pPr marL="1143000" lvl="2" indent="-228600">
+              <a:lnSpc>
+                <a:spcPct val="107000"/>
+              </a:lnSpc>
+              <a:spcAft>
+                <a:spcPts val="800"/>
+              </a:spcAft>
+              <a:buFont typeface="Wingdings" panose="05000000000000000000" pitchFamily="2" charset="2"/>
+              <a:buChar char=""/>
+            </a:pPr>
+            <a:r>
+              <a:rPr lang="en-US" dirty="0">
+                <a:latin typeface="Calibri" panose="020F0502020204030204" pitchFamily="34" charset="0"/>
+                <a:ea typeface="Calibri" panose="020F0502020204030204" pitchFamily="34" charset="0"/>
+                <a:cs typeface="Times New Roman" panose="02020603050405020304" pitchFamily="18" charset="0"/>
+              </a:rPr>
+              <a:t>Administrator</a:t>
+            </a:r>
+            <a:endParaRPr lang="en-US" sz="1050" dirty="0">
+              <a:latin typeface="Calibri" panose="020F0502020204030204" pitchFamily="34" charset="0"/>
+              <a:ea typeface="Calibri" panose="020F0502020204030204" pitchFamily="34" charset="0"/>
+              <a:cs typeface="Times New Roman" panose="02020603050405020304" pitchFamily="18" charset="0"/>
+            </a:endParaRPr>
+          </a:p>
+          <a:p>
+            <a:pPr marL="742950" lvl="1" indent="-285750">
+              <a:lnSpc>
+                <a:spcPct val="107000"/>
+              </a:lnSpc>
+              <a:spcAft>
+                <a:spcPts val="0"/>
+              </a:spcAft>
+              <a:buFont typeface="Courier New" panose="02070309020205020404" pitchFamily="49" charset="0"/>
+              <a:buChar char="o"/>
+            </a:pPr>
+            <a:r>
+              <a:rPr lang="en-US" b="1" dirty="0">
+                <a:latin typeface="Calibri" panose="020F0502020204030204" pitchFamily="34" charset="0"/>
+                <a:ea typeface="Calibri" panose="020F0502020204030204" pitchFamily="34" charset="0"/>
+                <a:cs typeface="Times New Roman" panose="02020603050405020304" pitchFamily="18" charset="0"/>
+              </a:rPr>
+              <a:t>Actor’s Goals:</a:t>
+            </a:r>
+            <a:endParaRPr lang="en-US" sz="1050" dirty="0">
+              <a:latin typeface="Calibri" panose="020F0502020204030204" pitchFamily="34" charset="0"/>
+              <a:ea typeface="Calibri" panose="020F0502020204030204" pitchFamily="34" charset="0"/>
+              <a:cs typeface="Times New Roman" panose="02020603050405020304" pitchFamily="18" charset="0"/>
+            </a:endParaRPr>
+          </a:p>
+          <a:p>
+            <a:pPr marL="1143000" lvl="2" indent="-228600">
+              <a:lnSpc>
+                <a:spcPct val="107000"/>
+              </a:lnSpc>
+              <a:spcAft>
+                <a:spcPts val="0"/>
+              </a:spcAft>
+              <a:buFont typeface="Wingdings" panose="05000000000000000000" pitchFamily="2" charset="2"/>
+              <a:buChar char=""/>
+            </a:pPr>
+            <a:r>
+              <a:rPr lang="en-US" dirty="0">
+                <a:latin typeface="Calibri" panose="020F0502020204030204" pitchFamily="34" charset="0"/>
+                <a:ea typeface="Calibri" panose="020F0502020204030204" pitchFamily="34" charset="0"/>
+                <a:cs typeface="Times New Roman" panose="02020603050405020304" pitchFamily="18" charset="0"/>
+              </a:rPr>
+              <a:t>Login to </a:t>
+            </a:r>
+            <a:r>
+              <a:rPr lang="en-US" dirty="0" err="1">
+                <a:latin typeface="Calibri" panose="020F0502020204030204" pitchFamily="34" charset="0"/>
+                <a:ea typeface="Calibri" panose="020F0502020204030204" pitchFamily="34" charset="0"/>
+                <a:cs typeface="Times New Roman" panose="02020603050405020304" pitchFamily="18" charset="0"/>
+              </a:rPr>
+              <a:t>SportPlex</a:t>
+            </a:r>
+            <a:r>
+              <a:rPr lang="en-US" dirty="0">
+                <a:latin typeface="Calibri" panose="020F0502020204030204" pitchFamily="34" charset="0"/>
+                <a:ea typeface="Calibri" panose="020F0502020204030204" pitchFamily="34" charset="0"/>
+                <a:cs typeface="Times New Roman" panose="02020603050405020304" pitchFamily="18" charset="0"/>
+              </a:rPr>
+              <a:t> and begin using the website.</a:t>
+            </a:r>
+            <a:endParaRPr lang="en-US" sz="1050" dirty="0">
+              <a:latin typeface="Calibri" panose="020F0502020204030204" pitchFamily="34" charset="0"/>
+              <a:ea typeface="Calibri" panose="020F0502020204030204" pitchFamily="34" charset="0"/>
+              <a:cs typeface="Times New Roman" panose="02020603050405020304" pitchFamily="18" charset="0"/>
+            </a:endParaRPr>
+          </a:p>
+          <a:p>
+            <a:pPr marL="742950" lvl="1" indent="-285750">
+              <a:lnSpc>
+                <a:spcPct val="107000"/>
+              </a:lnSpc>
+              <a:spcAft>
+                <a:spcPts val="0"/>
+              </a:spcAft>
+              <a:buFont typeface="Courier New" panose="02070309020205020404" pitchFamily="49" charset="0"/>
+              <a:buChar char="o"/>
+            </a:pPr>
+            <a:r>
+              <a:rPr lang="en-US" b="1" dirty="0">
+                <a:latin typeface="Calibri" panose="020F0502020204030204" pitchFamily="34" charset="0"/>
+                <a:ea typeface="Calibri" panose="020F0502020204030204" pitchFamily="34" charset="0"/>
+                <a:cs typeface="Times New Roman" panose="02020603050405020304" pitchFamily="18" charset="0"/>
+              </a:rPr>
+              <a:t>Preconditions:</a:t>
+            </a:r>
+            <a:endParaRPr lang="en-US" sz="1050" dirty="0">
+              <a:latin typeface="Calibri" panose="020F0502020204030204" pitchFamily="34" charset="0"/>
+              <a:ea typeface="Calibri" panose="020F0502020204030204" pitchFamily="34" charset="0"/>
+              <a:cs typeface="Times New Roman" panose="02020603050405020304" pitchFamily="18" charset="0"/>
+            </a:endParaRPr>
+          </a:p>
+          <a:p>
+            <a:pPr marL="1143000" lvl="2" indent="-228600">
+              <a:lnSpc>
+                <a:spcPct val="107000"/>
+              </a:lnSpc>
+              <a:spcAft>
+                <a:spcPts val="0"/>
+              </a:spcAft>
+              <a:buFont typeface="Wingdings" panose="05000000000000000000" pitchFamily="2" charset="2"/>
+              <a:buChar char=""/>
+            </a:pPr>
+            <a:r>
+              <a:rPr lang="en-US" dirty="0">
+                <a:latin typeface="Calibri" panose="020F0502020204030204" pitchFamily="34" charset="0"/>
+                <a:ea typeface="Calibri" panose="020F0502020204030204" pitchFamily="34" charset="0"/>
+                <a:cs typeface="Times New Roman" panose="02020603050405020304" pitchFamily="18" charset="0"/>
+              </a:rPr>
+              <a:t>All users are already registered for the website.</a:t>
+            </a:r>
+            <a:endParaRPr lang="en-US" sz="1050" dirty="0">
+              <a:latin typeface="Calibri" panose="020F0502020204030204" pitchFamily="34" charset="0"/>
+              <a:ea typeface="Calibri" panose="020F0502020204030204" pitchFamily="34" charset="0"/>
+              <a:cs typeface="Times New Roman" panose="02020603050405020304" pitchFamily="18" charset="0"/>
+            </a:endParaRPr>
+          </a:p>
+          <a:p>
+            <a:pPr marL="1143000" lvl="2" indent="-228600">
+              <a:lnSpc>
+                <a:spcPct val="107000"/>
+              </a:lnSpc>
+              <a:spcAft>
+                <a:spcPts val="0"/>
+              </a:spcAft>
+              <a:buFont typeface="Wingdings" panose="05000000000000000000" pitchFamily="2" charset="2"/>
+              <a:buChar char=""/>
+            </a:pPr>
+            <a:r>
+              <a:rPr lang="en-US" dirty="0">
+                <a:latin typeface="Calibri" panose="020F0502020204030204" pitchFamily="34" charset="0"/>
+                <a:ea typeface="Calibri" panose="020F0502020204030204" pitchFamily="34" charset="0"/>
+                <a:cs typeface="Times New Roman" panose="02020603050405020304" pitchFamily="18" charset="0"/>
+              </a:rPr>
+              <a:t>All users are not already signed into the website.</a:t>
+            </a:r>
+            <a:endParaRPr lang="en-US" sz="1050" dirty="0">
+              <a:latin typeface="Calibri" panose="020F0502020204030204" pitchFamily="34" charset="0"/>
+              <a:ea typeface="Calibri" panose="020F0502020204030204" pitchFamily="34" charset="0"/>
+              <a:cs typeface="Times New Roman" panose="02020603050405020304" pitchFamily="18" charset="0"/>
+            </a:endParaRPr>
+          </a:p>
+          <a:p>
+            <a:pPr marL="742950" lvl="1" indent="-285750">
+              <a:lnSpc>
+                <a:spcPct val="107000"/>
+              </a:lnSpc>
+              <a:spcAft>
+                <a:spcPts val="0"/>
+              </a:spcAft>
+              <a:buFont typeface="Courier New" panose="02070309020205020404" pitchFamily="49" charset="0"/>
+              <a:buChar char="o"/>
+            </a:pPr>
+            <a:r>
+              <a:rPr lang="en-US" b="1" dirty="0" err="1">
+                <a:latin typeface="Calibri" panose="020F0502020204030204" pitchFamily="34" charset="0"/>
+                <a:ea typeface="Calibri" panose="020F0502020204030204" pitchFamily="34" charset="0"/>
+                <a:cs typeface="Times New Roman" panose="02020603050405020304" pitchFamily="18" charset="0"/>
+              </a:rPr>
+              <a:t>Postconditions</a:t>
+            </a:r>
+            <a:r>
+              <a:rPr lang="en-US" b="1" dirty="0">
+                <a:latin typeface="Calibri" panose="020F0502020204030204" pitchFamily="34" charset="0"/>
+                <a:ea typeface="Calibri" panose="020F0502020204030204" pitchFamily="34" charset="0"/>
+                <a:cs typeface="Times New Roman" panose="02020603050405020304" pitchFamily="18" charset="0"/>
+              </a:rPr>
+              <a:t>:</a:t>
+            </a:r>
+            <a:endParaRPr lang="en-US" sz="1050" dirty="0">
+              <a:latin typeface="Calibri" panose="020F0502020204030204" pitchFamily="34" charset="0"/>
+              <a:ea typeface="Calibri" panose="020F0502020204030204" pitchFamily="34" charset="0"/>
+              <a:cs typeface="Times New Roman" panose="02020603050405020304" pitchFamily="18" charset="0"/>
+            </a:endParaRPr>
+          </a:p>
+          <a:p>
+            <a:pPr marL="1143000" lvl="2" indent="-228600">
+              <a:lnSpc>
+                <a:spcPct val="107000"/>
+              </a:lnSpc>
+              <a:spcAft>
+                <a:spcPts val="800"/>
+              </a:spcAft>
+              <a:buFont typeface="Wingdings" panose="05000000000000000000" pitchFamily="2" charset="2"/>
+              <a:buChar char=""/>
+            </a:pPr>
+            <a:r>
+              <a:rPr lang="en-US" dirty="0">
+                <a:latin typeface="Calibri" panose="020F0502020204030204" pitchFamily="34" charset="0"/>
+                <a:ea typeface="Calibri" panose="020F0502020204030204" pitchFamily="34" charset="0"/>
+                <a:cs typeface="Times New Roman" panose="02020603050405020304" pitchFamily="18" charset="0"/>
+              </a:rPr>
+              <a:t>All users are sent to User’s home page.</a:t>
+            </a:r>
+            <a:endParaRPr lang="en-US" sz="1050" dirty="0">
+              <a:latin typeface="Calibri" panose="020F0502020204030204" pitchFamily="34" charset="0"/>
+              <a:ea typeface="Calibri" panose="020F0502020204030204" pitchFamily="34" charset="0"/>
+              <a:cs typeface="Times New Roman" panose="02020603050405020304" pitchFamily="18" charset="0"/>
+            </a:endParaRPr>
+          </a:p>
+          <a:p>
+            <a:endParaRPr lang="en-US" dirty="0"/>
+          </a:p>
+        </p:txBody>
+      </p:sp>
+    </p:spTree>
+    <p:extLst>
+      <p:ext uri="{BB962C8B-B14F-4D97-AF65-F5344CB8AC3E}">
+        <p14:creationId xmlns:p14="http://schemas.microsoft.com/office/powerpoint/2010/main" val="3117978532"/>
+      </p:ext>
+    </p:extLst>
+  </p:cSld>
+  <p:clrMapOvr>
+    <a:masterClrMapping/>
+  </p:clrMapOvr>
+  <p:timing>
+    <p:tnLst>
+      <p:par>
+        <p:cTn id="1" dur="indefinite" restart="never" nodeType="tmRoot"/>
+      </p:par>
+    </p:tnLst>
+  </p:timing>
+</p:sld>
+</file>
+
+<file path=ppt/slides/slide7.xml><?xml version="1.0" encoding="utf-8"?>
+<p:sld xmlns:a="http://schemas.openxmlformats.org/drawingml/2006/main" xmlns:r="http://schemas.openxmlformats.org/officeDocument/2006/relationships" xmlns:p="http://schemas.openxmlformats.org/presentationml/2006/main">
+  <p:cSld>
+    <p:spTree>
+      <p:nvGrpSpPr>
+        <p:cNvPr id="1" name=""/>
+        <p:cNvGrpSpPr/>
+        <p:nvPr/>
+      </p:nvGrpSpPr>
+      <p:grpSpPr>
+        <a:xfrm>
+          <a:off x="0" y="0"/>
+          <a:ext cx="0" cy="0"/>
+          <a:chOff x="0" y="0"/>
+          <a:chExt cx="0" cy="0"/>
+        </a:xfrm>
+      </p:grpSpPr>
+      <p:sp>
+        <p:nvSpPr>
+          <p:cNvPr id="3" name="Text Placeholder 2"/>
+          <p:cNvSpPr>
+            <a:spLocks noGrp="1"/>
+          </p:cNvSpPr>
+          <p:nvPr>
+            <p:ph type="body" idx="1"/>
+          </p:nvPr>
+        </p:nvSpPr>
+        <p:spPr>
+          <a:xfrm>
+            <a:off x="1496056" y="977109"/>
+            <a:ext cx="7038900" cy="3575950"/>
+          </a:xfrm>
+        </p:spPr>
+        <p:txBody>
+          <a:bodyPr/>
+          <a:lstStyle/>
+          <a:p>
+            <a:pPr marL="742950" lvl="1" indent="-285750">
+              <a:lnSpc>
+                <a:spcPct val="107000"/>
+              </a:lnSpc>
+              <a:spcAft>
+                <a:spcPts val="0"/>
+              </a:spcAft>
+              <a:buFont typeface="Courier New" panose="02070309020205020404" pitchFamily="49" charset="0"/>
+              <a:buChar char="o"/>
+            </a:pPr>
+            <a:r>
+              <a:rPr lang="en-US" b="1" dirty="0">
+                <a:latin typeface="Calibri" panose="020F0502020204030204" pitchFamily="34" charset="0"/>
+                <a:ea typeface="Calibri" panose="020F0502020204030204" pitchFamily="34" charset="0"/>
+                <a:cs typeface="Times New Roman" panose="02020603050405020304" pitchFamily="18" charset="0"/>
+              </a:rPr>
+              <a:t>Flow of Events for Main Success Scenario:</a:t>
+            </a:r>
+            <a:endParaRPr lang="en-US" sz="1050" dirty="0">
+              <a:latin typeface="Calibri" panose="020F0502020204030204" pitchFamily="34" charset="0"/>
+              <a:ea typeface="Calibri" panose="020F0502020204030204" pitchFamily="34" charset="0"/>
+              <a:cs typeface="Times New Roman" panose="02020603050405020304" pitchFamily="18" charset="0"/>
+            </a:endParaRPr>
+          </a:p>
+          <a:p>
+            <a:pPr marL="1143000" lvl="2" indent="-228600">
+              <a:lnSpc>
+                <a:spcPct val="107000"/>
+              </a:lnSpc>
+              <a:spcAft>
+                <a:spcPts val="0"/>
+              </a:spcAft>
+              <a:buFont typeface="Wingdings" panose="05000000000000000000" pitchFamily="2" charset="2"/>
+              <a:buChar char=""/>
+            </a:pPr>
+            <a:r>
+              <a:rPr lang="en-US" dirty="0">
+                <a:latin typeface="Calibri" panose="020F0502020204030204" pitchFamily="34" charset="0"/>
+                <a:ea typeface="Calibri" panose="020F0502020204030204" pitchFamily="34" charset="0"/>
+                <a:cs typeface="Times New Roman" panose="02020603050405020304" pitchFamily="18" charset="0"/>
+              </a:rPr>
+              <a:t>Users navigate to the </a:t>
+            </a:r>
+            <a:r>
+              <a:rPr lang="en-US" dirty="0" err="1">
+                <a:latin typeface="Calibri" panose="020F0502020204030204" pitchFamily="34" charset="0"/>
+                <a:ea typeface="Calibri" panose="020F0502020204030204" pitchFamily="34" charset="0"/>
+                <a:cs typeface="Times New Roman" panose="02020603050405020304" pitchFamily="18" charset="0"/>
+              </a:rPr>
+              <a:t>SportPlex</a:t>
+            </a:r>
+            <a:r>
+              <a:rPr lang="en-US" dirty="0">
+                <a:latin typeface="Calibri" panose="020F0502020204030204" pitchFamily="34" charset="0"/>
+                <a:ea typeface="Calibri" panose="020F0502020204030204" pitchFamily="34" charset="0"/>
+                <a:cs typeface="Times New Roman" panose="02020603050405020304" pitchFamily="18" charset="0"/>
+              </a:rPr>
+              <a:t> website.</a:t>
+            </a:r>
+            <a:endParaRPr lang="en-US" sz="1050" dirty="0">
+              <a:latin typeface="Calibri" panose="020F0502020204030204" pitchFamily="34" charset="0"/>
+              <a:ea typeface="Calibri" panose="020F0502020204030204" pitchFamily="34" charset="0"/>
+              <a:cs typeface="Times New Roman" panose="02020603050405020304" pitchFamily="18" charset="0"/>
+            </a:endParaRPr>
+          </a:p>
+          <a:p>
+            <a:pPr marL="1143000" lvl="2" indent="-228600">
+              <a:lnSpc>
+                <a:spcPct val="107000"/>
+              </a:lnSpc>
+              <a:spcAft>
+                <a:spcPts val="0"/>
+              </a:spcAft>
+              <a:buFont typeface="Wingdings" panose="05000000000000000000" pitchFamily="2" charset="2"/>
+              <a:buChar char=""/>
+            </a:pPr>
+            <a:r>
+              <a:rPr lang="en-US" dirty="0">
+                <a:latin typeface="Calibri" panose="020F0502020204030204" pitchFamily="34" charset="0"/>
+                <a:ea typeface="Calibri" panose="020F0502020204030204" pitchFamily="34" charset="0"/>
+                <a:cs typeface="Times New Roman" panose="02020603050405020304" pitchFamily="18" charset="0"/>
+              </a:rPr>
+              <a:t>Customers click on “Customer Login” Button (Trigger Action).</a:t>
+            </a:r>
+            <a:endParaRPr lang="en-US" sz="1050" dirty="0">
+              <a:latin typeface="Calibri" panose="020F0502020204030204" pitchFamily="34" charset="0"/>
+              <a:ea typeface="Calibri" panose="020F0502020204030204" pitchFamily="34" charset="0"/>
+              <a:cs typeface="Times New Roman" panose="02020603050405020304" pitchFamily="18" charset="0"/>
+            </a:endParaRPr>
+          </a:p>
+          <a:p>
+            <a:pPr marL="1143000" lvl="2" indent="-228600">
+              <a:lnSpc>
+                <a:spcPct val="107000"/>
+              </a:lnSpc>
+              <a:spcAft>
+                <a:spcPts val="0"/>
+              </a:spcAft>
+              <a:buFont typeface="Wingdings" panose="05000000000000000000" pitchFamily="2" charset="2"/>
+              <a:buChar char=""/>
+            </a:pPr>
+            <a:r>
+              <a:rPr lang="en-US" dirty="0">
+                <a:latin typeface="Calibri" panose="020F0502020204030204" pitchFamily="34" charset="0"/>
+                <a:ea typeface="Calibri" panose="020F0502020204030204" pitchFamily="34" charset="0"/>
+                <a:cs typeface="Times New Roman" panose="02020603050405020304" pitchFamily="18" charset="0"/>
+              </a:rPr>
+              <a:t>Employee’s click on “Employee Login” Button (Trigger Action).</a:t>
+            </a:r>
+            <a:endParaRPr lang="en-US" sz="1050" dirty="0">
+              <a:latin typeface="Calibri" panose="020F0502020204030204" pitchFamily="34" charset="0"/>
+              <a:ea typeface="Calibri" panose="020F0502020204030204" pitchFamily="34" charset="0"/>
+              <a:cs typeface="Times New Roman" panose="02020603050405020304" pitchFamily="18" charset="0"/>
+            </a:endParaRPr>
+          </a:p>
+          <a:p>
+            <a:pPr marL="1143000" lvl="2" indent="-228600">
+              <a:lnSpc>
+                <a:spcPct val="107000"/>
+              </a:lnSpc>
+              <a:spcAft>
+                <a:spcPts val="0"/>
+              </a:spcAft>
+              <a:buFont typeface="Wingdings" panose="05000000000000000000" pitchFamily="2" charset="2"/>
+              <a:buChar char=""/>
+            </a:pPr>
+            <a:r>
+              <a:rPr lang="en-US" dirty="0">
+                <a:latin typeface="Calibri" panose="020F0502020204030204" pitchFamily="34" charset="0"/>
+                <a:ea typeface="Calibri" panose="020F0502020204030204" pitchFamily="34" charset="0"/>
+                <a:cs typeface="Times New Roman" panose="02020603050405020304" pitchFamily="18" charset="0"/>
+              </a:rPr>
+              <a:t>System prompts the Customer for login credentials.</a:t>
+            </a:r>
+            <a:endParaRPr lang="en-US" sz="1050" dirty="0">
+              <a:latin typeface="Calibri" panose="020F0502020204030204" pitchFamily="34" charset="0"/>
+              <a:ea typeface="Calibri" panose="020F0502020204030204" pitchFamily="34" charset="0"/>
+              <a:cs typeface="Times New Roman" panose="02020603050405020304" pitchFamily="18" charset="0"/>
+            </a:endParaRPr>
+          </a:p>
+          <a:p>
+            <a:pPr marL="1143000" lvl="2" indent="-228600">
+              <a:lnSpc>
+                <a:spcPct val="107000"/>
+              </a:lnSpc>
+              <a:spcAft>
+                <a:spcPts val="0"/>
+              </a:spcAft>
+              <a:buFont typeface="Wingdings" panose="05000000000000000000" pitchFamily="2" charset="2"/>
+              <a:buChar char=""/>
+            </a:pPr>
+            <a:r>
+              <a:rPr lang="en-US" dirty="0">
+                <a:latin typeface="Calibri" panose="020F0502020204030204" pitchFamily="34" charset="0"/>
+                <a:ea typeface="Calibri" panose="020F0502020204030204" pitchFamily="34" charset="0"/>
+                <a:cs typeface="Times New Roman" panose="02020603050405020304" pitchFamily="18" charset="0"/>
+              </a:rPr>
+              <a:t>Customer enters the login credentials and presses “Login”.</a:t>
+            </a:r>
+            <a:endParaRPr lang="en-US" sz="1050" dirty="0">
+              <a:latin typeface="Calibri" panose="020F0502020204030204" pitchFamily="34" charset="0"/>
+              <a:ea typeface="Calibri" panose="020F0502020204030204" pitchFamily="34" charset="0"/>
+              <a:cs typeface="Times New Roman" panose="02020603050405020304" pitchFamily="18" charset="0"/>
+            </a:endParaRPr>
+          </a:p>
+          <a:p>
+            <a:pPr marL="1143000" lvl="2" indent="-228600">
+              <a:lnSpc>
+                <a:spcPct val="107000"/>
+              </a:lnSpc>
+              <a:spcAft>
+                <a:spcPts val="0"/>
+              </a:spcAft>
+              <a:buFont typeface="Wingdings" panose="05000000000000000000" pitchFamily="2" charset="2"/>
+              <a:buChar char=""/>
+            </a:pPr>
+            <a:r>
+              <a:rPr lang="en-US" dirty="0">
+                <a:latin typeface="Calibri" panose="020F0502020204030204" pitchFamily="34" charset="0"/>
+                <a:ea typeface="Calibri" panose="020F0502020204030204" pitchFamily="34" charset="0"/>
+                <a:cs typeface="Times New Roman" panose="02020603050405020304" pitchFamily="18" charset="0"/>
+              </a:rPr>
+              <a:t>System prompts the Employee for login credentials.</a:t>
+            </a:r>
+            <a:endParaRPr lang="en-US" sz="1050" dirty="0">
+              <a:latin typeface="Calibri" panose="020F0502020204030204" pitchFamily="34" charset="0"/>
+              <a:ea typeface="Calibri" panose="020F0502020204030204" pitchFamily="34" charset="0"/>
+              <a:cs typeface="Times New Roman" panose="02020603050405020304" pitchFamily="18" charset="0"/>
+            </a:endParaRPr>
+          </a:p>
+          <a:p>
+            <a:pPr marL="1143000" lvl="2" indent="-228600">
+              <a:lnSpc>
+                <a:spcPct val="107000"/>
+              </a:lnSpc>
+              <a:spcAft>
+                <a:spcPts val="0"/>
+              </a:spcAft>
+              <a:buFont typeface="Wingdings" panose="05000000000000000000" pitchFamily="2" charset="2"/>
+              <a:buChar char=""/>
+            </a:pPr>
+            <a:r>
+              <a:rPr lang="en-US" dirty="0">
+                <a:latin typeface="Calibri" panose="020F0502020204030204" pitchFamily="34" charset="0"/>
+                <a:ea typeface="Calibri" panose="020F0502020204030204" pitchFamily="34" charset="0"/>
+                <a:cs typeface="Times New Roman" panose="02020603050405020304" pitchFamily="18" charset="0"/>
+              </a:rPr>
+              <a:t>Employee enters the login credentials and pressed “Login”.</a:t>
+            </a:r>
+            <a:endParaRPr lang="en-US" sz="1050" dirty="0">
+              <a:latin typeface="Calibri" panose="020F0502020204030204" pitchFamily="34" charset="0"/>
+              <a:ea typeface="Calibri" panose="020F0502020204030204" pitchFamily="34" charset="0"/>
+              <a:cs typeface="Times New Roman" panose="02020603050405020304" pitchFamily="18" charset="0"/>
+            </a:endParaRPr>
+          </a:p>
+          <a:p>
+            <a:pPr marL="742950" lvl="1" indent="-285750">
+              <a:lnSpc>
+                <a:spcPct val="107000"/>
+              </a:lnSpc>
+              <a:spcAft>
+                <a:spcPts val="0"/>
+              </a:spcAft>
+              <a:buFont typeface="Courier New" panose="02070309020205020404" pitchFamily="49" charset="0"/>
+              <a:buChar char="o"/>
+            </a:pPr>
+            <a:r>
+              <a:rPr lang="en-US" b="1" dirty="0">
+                <a:latin typeface="Calibri" panose="020F0502020204030204" pitchFamily="34" charset="0"/>
+                <a:ea typeface="Calibri" panose="020F0502020204030204" pitchFamily="34" charset="0"/>
+                <a:cs typeface="Times New Roman" panose="02020603050405020304" pitchFamily="18" charset="0"/>
+              </a:rPr>
+              <a:t>Alternate Flows:</a:t>
+            </a:r>
+            <a:endParaRPr lang="en-US" sz="1050" dirty="0">
+              <a:latin typeface="Calibri" panose="020F0502020204030204" pitchFamily="34" charset="0"/>
+              <a:ea typeface="Calibri" panose="020F0502020204030204" pitchFamily="34" charset="0"/>
+              <a:cs typeface="Times New Roman" panose="02020603050405020304" pitchFamily="18" charset="0"/>
+            </a:endParaRPr>
+          </a:p>
+          <a:p>
+            <a:pPr marL="1143000" lvl="2" indent="-228600">
+              <a:lnSpc>
+                <a:spcPct val="107000"/>
+              </a:lnSpc>
+              <a:spcAft>
+                <a:spcPts val="800"/>
+              </a:spcAft>
+              <a:buFont typeface="Wingdings" panose="05000000000000000000" pitchFamily="2" charset="2"/>
+              <a:buChar char=""/>
+            </a:pPr>
+            <a:r>
+              <a:rPr lang="en-US" dirty="0">
+                <a:latin typeface="Calibri" panose="020F0502020204030204" pitchFamily="34" charset="0"/>
+                <a:ea typeface="Calibri" panose="020F0502020204030204" pitchFamily="34" charset="0"/>
+                <a:cs typeface="Times New Roman" panose="02020603050405020304" pitchFamily="18" charset="0"/>
+              </a:rPr>
+              <a:t>System hesitates to log in user: User trying to access their account with entering the wrong credentials. Entering the correct credentials will fix this problem.</a:t>
+            </a:r>
+            <a:endParaRPr lang="en-US" sz="1050" dirty="0">
+              <a:latin typeface="Calibri" panose="020F0502020204030204" pitchFamily="34" charset="0"/>
+              <a:ea typeface="Calibri" panose="020F0502020204030204" pitchFamily="34" charset="0"/>
+              <a:cs typeface="Times New Roman" panose="02020603050405020304" pitchFamily="18" charset="0"/>
+            </a:endParaRPr>
+          </a:p>
+          <a:p>
+            <a:pPr marL="1143000" lvl="2" indent="-228600">
+              <a:lnSpc>
+                <a:spcPct val="107000"/>
+              </a:lnSpc>
+              <a:spcAft>
+                <a:spcPts val="800"/>
+              </a:spcAft>
+              <a:buFont typeface="Wingdings" panose="05000000000000000000" pitchFamily="2" charset="2"/>
+              <a:buChar char=""/>
+            </a:pPr>
+            <a:endParaRPr lang="en-US" sz="1050" dirty="0" smtClean="0">
+              <a:latin typeface="Calibri" panose="020F0502020204030204" pitchFamily="34" charset="0"/>
+              <a:ea typeface="Calibri" panose="020F0502020204030204" pitchFamily="34" charset="0"/>
+              <a:cs typeface="Times New Roman" panose="02020603050405020304" pitchFamily="18" charset="0"/>
+            </a:endParaRPr>
+          </a:p>
+          <a:p>
+            <a:endParaRPr lang="en-US" dirty="0"/>
+          </a:p>
+        </p:txBody>
+      </p:sp>
+    </p:spTree>
+    <p:extLst>
+      <p:ext uri="{BB962C8B-B14F-4D97-AF65-F5344CB8AC3E}">
+        <p14:creationId xmlns:p14="http://schemas.microsoft.com/office/powerpoint/2010/main" val="2157410093"/>
+      </p:ext>
+    </p:extLst>
+  </p:cSld>
+  <p:clrMapOvr>
+    <a:masterClrMapping/>
+  </p:clrMapOvr>
+  <p:timing>
+    <p:tnLst>
+      <p:par>
+        <p:cTn id="1" dur="indefinite" restart="never" nodeType="tmRoot"/>
+      </p:par>
+    </p:tnLst>
+  </p:timing>
+</p:sld>
+</file>
+
+<file path=ppt/slides/slide8.xml><?xml version="1.0" encoding="utf-8"?>
+<p:sld xmlns:a="http://schemas.openxmlformats.org/drawingml/2006/main" xmlns:r="http://schemas.openxmlformats.org/officeDocument/2006/relationships" xmlns:p="http://schemas.openxmlformats.org/presentationml/2006/main">
+  <p:cSld>
+    <p:spTree>
+      <p:nvGrpSpPr>
+        <p:cNvPr id="1" name=""/>
+        <p:cNvGrpSpPr/>
+        <p:nvPr/>
+      </p:nvGrpSpPr>
+      <p:grpSpPr>
+        <a:xfrm>
+          <a:off x="0" y="0"/>
+          <a:ext cx="0" cy="0"/>
+          <a:chOff x="0" y="0"/>
+          <a:chExt cx="0" cy="0"/>
+        </a:xfrm>
+      </p:grpSpPr>
+      <p:sp>
+        <p:nvSpPr>
+          <p:cNvPr id="2" name="Title 1"/>
+          <p:cNvSpPr>
+            <a:spLocks noGrp="1"/>
+          </p:cNvSpPr>
+          <p:nvPr>
+            <p:ph type="title"/>
+          </p:nvPr>
+        </p:nvSpPr>
+        <p:spPr/>
+        <p:txBody>
+          <a:bodyPr/>
+          <a:lstStyle/>
+          <a:p>
+            <a:r>
+              <a:rPr lang="en-US" b="1" dirty="0">
+                <a:latin typeface="Calibri" panose="020F0502020204030204" pitchFamily="34" charset="0"/>
+                <a:ea typeface="Calibri" panose="020F0502020204030204" pitchFamily="34" charset="0"/>
+                <a:cs typeface="Times New Roman" panose="02020603050405020304" pitchFamily="18" charset="0"/>
+              </a:rPr>
+              <a:t>Use Case UC – 4: </a:t>
+            </a:r>
+            <a:r>
+              <a:rPr lang="en-US" b="1" dirty="0" smtClean="0">
+                <a:latin typeface="Calibri" panose="020F0502020204030204" pitchFamily="34" charset="0"/>
+                <a:ea typeface="Calibri" panose="020F0502020204030204" pitchFamily="34" charset="0"/>
+                <a:cs typeface="Times New Roman" panose="02020603050405020304" pitchFamily="18" charset="0"/>
+              </a:rPr>
+              <a:t>User’s Home </a:t>
+            </a:r>
+            <a:r>
+              <a:rPr lang="en-US" b="1" dirty="0">
+                <a:latin typeface="Calibri" panose="020F0502020204030204" pitchFamily="34" charset="0"/>
+                <a:ea typeface="Calibri" panose="020F0502020204030204" pitchFamily="34" charset="0"/>
+                <a:cs typeface="Times New Roman" panose="02020603050405020304" pitchFamily="18" charset="0"/>
+              </a:rPr>
+              <a:t>Page</a:t>
+            </a:r>
+            <a:endParaRPr lang="en-US" dirty="0"/>
+          </a:p>
+        </p:txBody>
+      </p:sp>
+      <p:sp>
+        <p:nvSpPr>
+          <p:cNvPr id="3" name="Text Placeholder 2"/>
+          <p:cNvSpPr>
+            <a:spLocks noGrp="1"/>
+          </p:cNvSpPr>
+          <p:nvPr>
+            <p:ph type="body" idx="1"/>
+          </p:nvPr>
+        </p:nvSpPr>
+        <p:spPr>
+          <a:xfrm>
+            <a:off x="1297500" y="1154764"/>
+            <a:ext cx="7038900" cy="3892724"/>
+          </a:xfrm>
+        </p:spPr>
+        <p:txBody>
+          <a:bodyPr/>
+          <a:lstStyle/>
+          <a:p>
+            <a:pPr marL="1143000" lvl="2" indent="-228600">
+              <a:lnSpc>
+                <a:spcPct val="107000"/>
+              </a:lnSpc>
+              <a:spcAft>
+                <a:spcPts val="800"/>
+              </a:spcAft>
+              <a:buFont typeface="Wingdings" panose="05000000000000000000" pitchFamily="2" charset="2"/>
+              <a:buChar char=""/>
+            </a:pPr>
+            <a:endParaRPr lang="en-US" sz="1050" dirty="0" smtClean="0">
+              <a:latin typeface="Calibri" panose="020F0502020204030204" pitchFamily="34" charset="0"/>
+              <a:ea typeface="Calibri" panose="020F0502020204030204" pitchFamily="34" charset="0"/>
+              <a:cs typeface="Times New Roman" panose="02020603050405020304" pitchFamily="18" charset="0"/>
+            </a:endParaRPr>
+          </a:p>
+          <a:p>
+            <a:pPr marL="742950" lvl="1" indent="-285750">
+              <a:lnSpc>
+                <a:spcPct val="107000"/>
+              </a:lnSpc>
+              <a:spcAft>
+                <a:spcPts val="0"/>
+              </a:spcAft>
+              <a:buFont typeface="Courier New" panose="02070309020205020404" pitchFamily="49" charset="0"/>
+              <a:buChar char="o"/>
+            </a:pPr>
+            <a:r>
+              <a:rPr lang="en-US" b="1" dirty="0">
+                <a:latin typeface="Calibri" panose="020F0502020204030204" pitchFamily="34" charset="0"/>
+                <a:ea typeface="Calibri" panose="020F0502020204030204" pitchFamily="34" charset="0"/>
+                <a:cs typeface="Times New Roman" panose="02020603050405020304" pitchFamily="18" charset="0"/>
+              </a:rPr>
+              <a:t>Summary:</a:t>
+            </a:r>
+            <a:endParaRPr lang="en-US" sz="1050" dirty="0">
+              <a:latin typeface="Calibri" panose="020F0502020204030204" pitchFamily="34" charset="0"/>
+              <a:ea typeface="Calibri" panose="020F0502020204030204" pitchFamily="34" charset="0"/>
+              <a:cs typeface="Times New Roman" panose="02020603050405020304" pitchFamily="18" charset="0"/>
+            </a:endParaRPr>
+          </a:p>
+          <a:p>
+            <a:pPr marL="1143000" lvl="2" indent="-228600">
+              <a:lnSpc>
+                <a:spcPct val="107000"/>
+              </a:lnSpc>
+              <a:spcAft>
+                <a:spcPts val="0"/>
+              </a:spcAft>
+              <a:buFont typeface="Wingdings" panose="05000000000000000000" pitchFamily="2" charset="2"/>
+              <a:buChar char=""/>
+            </a:pPr>
+            <a:r>
+              <a:rPr lang="en-US" dirty="0">
+                <a:latin typeface="Calibri" panose="020F0502020204030204" pitchFamily="34" charset="0"/>
+                <a:ea typeface="Calibri" panose="020F0502020204030204" pitchFamily="34" charset="0"/>
+                <a:cs typeface="Times New Roman" panose="02020603050405020304" pitchFamily="18" charset="0"/>
+              </a:rPr>
+              <a:t>This use case is designed for giving users ability to see weekly events and important information. Each user will be able to view the home page without signing into their account. With that in mind, the functionality of what each user can do will be very limited. Users are giving the ability to a little preview of our site before creating an account.</a:t>
+            </a:r>
+            <a:endParaRPr lang="en-US" sz="1050" dirty="0">
+              <a:latin typeface="Calibri" panose="020F0502020204030204" pitchFamily="34" charset="0"/>
+              <a:ea typeface="Calibri" panose="020F0502020204030204" pitchFamily="34" charset="0"/>
+              <a:cs typeface="Times New Roman" panose="02020603050405020304" pitchFamily="18" charset="0"/>
+            </a:endParaRPr>
+          </a:p>
+          <a:p>
+            <a:pPr marL="742950" lvl="1" indent="-285750">
+              <a:lnSpc>
+                <a:spcPct val="107000"/>
+              </a:lnSpc>
+              <a:spcAft>
+                <a:spcPts val="0"/>
+              </a:spcAft>
+              <a:buFont typeface="Courier New" panose="02070309020205020404" pitchFamily="49" charset="0"/>
+              <a:buChar char="o"/>
+            </a:pPr>
+            <a:r>
+              <a:rPr lang="en-US" b="1" dirty="0">
+                <a:latin typeface="Calibri" panose="020F0502020204030204" pitchFamily="34" charset="0"/>
+                <a:ea typeface="Calibri" panose="020F0502020204030204" pitchFamily="34" charset="0"/>
+                <a:cs typeface="Times New Roman" panose="02020603050405020304" pitchFamily="18" charset="0"/>
+              </a:rPr>
+              <a:t>Initialing Actor(s):</a:t>
+            </a:r>
+            <a:endParaRPr lang="en-US" sz="1050" dirty="0">
+              <a:latin typeface="Calibri" panose="020F0502020204030204" pitchFamily="34" charset="0"/>
+              <a:ea typeface="Calibri" panose="020F0502020204030204" pitchFamily="34" charset="0"/>
+              <a:cs typeface="Times New Roman" panose="02020603050405020304" pitchFamily="18" charset="0"/>
+            </a:endParaRPr>
+          </a:p>
+          <a:p>
+            <a:pPr marL="1143000" lvl="2" indent="-228600">
+              <a:lnSpc>
+                <a:spcPct val="107000"/>
+              </a:lnSpc>
+              <a:spcAft>
+                <a:spcPts val="0"/>
+              </a:spcAft>
+              <a:buFont typeface="Wingdings" panose="05000000000000000000" pitchFamily="2" charset="2"/>
+              <a:buChar char=""/>
+            </a:pPr>
+            <a:r>
+              <a:rPr lang="en-US" dirty="0">
+                <a:latin typeface="Calibri" panose="020F0502020204030204" pitchFamily="34" charset="0"/>
+                <a:ea typeface="Calibri" panose="020F0502020204030204" pitchFamily="34" charset="0"/>
+                <a:cs typeface="Times New Roman" panose="02020603050405020304" pitchFamily="18" charset="0"/>
+              </a:rPr>
+              <a:t>Customer </a:t>
+            </a:r>
+            <a:endParaRPr lang="en-US" sz="1050" dirty="0">
+              <a:latin typeface="Calibri" panose="020F0502020204030204" pitchFamily="34" charset="0"/>
+              <a:ea typeface="Calibri" panose="020F0502020204030204" pitchFamily="34" charset="0"/>
+              <a:cs typeface="Times New Roman" panose="02020603050405020304" pitchFamily="18" charset="0"/>
+            </a:endParaRPr>
+          </a:p>
+          <a:p>
+            <a:pPr marL="1143000" lvl="2" indent="-228600">
+              <a:lnSpc>
+                <a:spcPct val="107000"/>
+              </a:lnSpc>
+              <a:spcAft>
+                <a:spcPts val="0"/>
+              </a:spcAft>
+              <a:buFont typeface="Wingdings" panose="05000000000000000000" pitchFamily="2" charset="2"/>
+              <a:buChar char=""/>
+            </a:pPr>
+            <a:r>
+              <a:rPr lang="en-US" dirty="0">
+                <a:latin typeface="Calibri" panose="020F0502020204030204" pitchFamily="34" charset="0"/>
+                <a:ea typeface="Calibri" panose="020F0502020204030204" pitchFamily="34" charset="0"/>
+                <a:cs typeface="Times New Roman" panose="02020603050405020304" pitchFamily="18" charset="0"/>
+              </a:rPr>
+              <a:t>Employee</a:t>
+            </a:r>
+            <a:endParaRPr lang="en-US" sz="1050" dirty="0">
+              <a:latin typeface="Calibri" panose="020F0502020204030204" pitchFamily="34" charset="0"/>
+              <a:ea typeface="Calibri" panose="020F0502020204030204" pitchFamily="34" charset="0"/>
+              <a:cs typeface="Times New Roman" panose="02020603050405020304" pitchFamily="18" charset="0"/>
+            </a:endParaRPr>
+          </a:p>
+          <a:p>
+            <a:pPr marL="1143000" lvl="2" indent="-228600">
+              <a:lnSpc>
+                <a:spcPct val="107000"/>
+              </a:lnSpc>
+              <a:spcAft>
+                <a:spcPts val="800"/>
+              </a:spcAft>
+              <a:buFont typeface="Wingdings" panose="05000000000000000000" pitchFamily="2" charset="2"/>
+              <a:buChar char=""/>
+            </a:pPr>
+            <a:r>
+              <a:rPr lang="en-US" dirty="0">
+                <a:latin typeface="Calibri" panose="020F0502020204030204" pitchFamily="34" charset="0"/>
+                <a:ea typeface="Calibri" panose="020F0502020204030204" pitchFamily="34" charset="0"/>
+                <a:cs typeface="Times New Roman" panose="02020603050405020304" pitchFamily="18" charset="0"/>
+              </a:rPr>
+              <a:t>Administrator</a:t>
+            </a:r>
+            <a:endParaRPr lang="en-US" sz="1050" dirty="0">
+              <a:latin typeface="Calibri" panose="020F0502020204030204" pitchFamily="34" charset="0"/>
+              <a:ea typeface="Calibri" panose="020F0502020204030204" pitchFamily="34" charset="0"/>
+              <a:cs typeface="Times New Roman" panose="02020603050405020304" pitchFamily="18" charset="0"/>
+            </a:endParaRPr>
+          </a:p>
+          <a:p>
+            <a:pPr marL="742950" lvl="1" indent="-285750">
+              <a:lnSpc>
+                <a:spcPct val="107000"/>
+              </a:lnSpc>
+              <a:spcAft>
+                <a:spcPts val="0"/>
+              </a:spcAft>
+              <a:buFont typeface="Courier New" panose="02070309020205020404" pitchFamily="49" charset="0"/>
+              <a:buChar char="o"/>
+            </a:pPr>
+            <a:r>
+              <a:rPr lang="en-US" b="1" dirty="0">
+                <a:latin typeface="Calibri" panose="020F0502020204030204" pitchFamily="34" charset="0"/>
+                <a:ea typeface="Calibri" panose="020F0502020204030204" pitchFamily="34" charset="0"/>
+                <a:cs typeface="Times New Roman" panose="02020603050405020304" pitchFamily="18" charset="0"/>
+              </a:rPr>
+              <a:t>Actor Goals:</a:t>
+            </a:r>
+            <a:endParaRPr lang="en-US" sz="1050" dirty="0">
+              <a:latin typeface="Calibri" panose="020F0502020204030204" pitchFamily="34" charset="0"/>
+              <a:ea typeface="Calibri" panose="020F0502020204030204" pitchFamily="34" charset="0"/>
+              <a:cs typeface="Times New Roman" panose="02020603050405020304" pitchFamily="18" charset="0"/>
+            </a:endParaRPr>
+          </a:p>
+          <a:p>
+            <a:pPr marL="1143000" lvl="2" indent="-228600">
+              <a:lnSpc>
+                <a:spcPct val="107000"/>
+              </a:lnSpc>
+              <a:spcAft>
+                <a:spcPts val="0"/>
+              </a:spcAft>
+              <a:buFont typeface="Wingdings" panose="05000000000000000000" pitchFamily="2" charset="2"/>
+              <a:buChar char=""/>
+            </a:pPr>
+            <a:r>
+              <a:rPr lang="en-US" dirty="0">
+                <a:latin typeface="Calibri" panose="020F0502020204030204" pitchFamily="34" charset="0"/>
+                <a:ea typeface="Calibri" panose="020F0502020204030204" pitchFamily="34" charset="0"/>
+                <a:cs typeface="Times New Roman" panose="02020603050405020304" pitchFamily="18" charset="0"/>
+              </a:rPr>
+              <a:t>Giving users ability to view important/needed information.</a:t>
+            </a:r>
+            <a:endParaRPr lang="en-US" sz="1050" dirty="0">
+              <a:latin typeface="Calibri" panose="020F0502020204030204" pitchFamily="34" charset="0"/>
+              <a:ea typeface="Calibri" panose="020F0502020204030204" pitchFamily="34" charset="0"/>
+              <a:cs typeface="Times New Roman" panose="02020603050405020304" pitchFamily="18" charset="0"/>
+            </a:endParaRPr>
+          </a:p>
+          <a:p>
+            <a:pPr marL="742950" lvl="1" indent="-285750">
+              <a:lnSpc>
+                <a:spcPct val="107000"/>
+              </a:lnSpc>
+              <a:spcAft>
+                <a:spcPts val="0"/>
+              </a:spcAft>
+              <a:buFont typeface="Courier New" panose="02070309020205020404" pitchFamily="49" charset="0"/>
+              <a:buChar char="o"/>
+            </a:pPr>
+            <a:r>
+              <a:rPr lang="en-US" b="1" dirty="0">
+                <a:latin typeface="Calibri" panose="020F0502020204030204" pitchFamily="34" charset="0"/>
+                <a:ea typeface="Calibri" panose="020F0502020204030204" pitchFamily="34" charset="0"/>
+                <a:cs typeface="Times New Roman" panose="02020603050405020304" pitchFamily="18" charset="0"/>
+              </a:rPr>
+              <a:t>Preconditions:</a:t>
+            </a:r>
+            <a:endParaRPr lang="en-US" sz="1050" dirty="0">
+              <a:latin typeface="Calibri" panose="020F0502020204030204" pitchFamily="34" charset="0"/>
+              <a:ea typeface="Calibri" panose="020F0502020204030204" pitchFamily="34" charset="0"/>
+              <a:cs typeface="Times New Roman" panose="02020603050405020304" pitchFamily="18" charset="0"/>
+            </a:endParaRPr>
+          </a:p>
+          <a:p>
+            <a:pPr marL="1143000" lvl="2" indent="-228600">
+              <a:lnSpc>
+                <a:spcPct val="107000"/>
+              </a:lnSpc>
+              <a:spcAft>
+                <a:spcPts val="0"/>
+              </a:spcAft>
+              <a:buFont typeface="Wingdings" panose="05000000000000000000" pitchFamily="2" charset="2"/>
+              <a:buChar char=""/>
+            </a:pPr>
+            <a:r>
+              <a:rPr lang="en-US" dirty="0">
+                <a:latin typeface="Calibri" panose="020F0502020204030204" pitchFamily="34" charset="0"/>
+                <a:ea typeface="Calibri" panose="020F0502020204030204" pitchFamily="34" charset="0"/>
+                <a:cs typeface="Times New Roman" panose="02020603050405020304" pitchFamily="18" charset="0"/>
+              </a:rPr>
+              <a:t>Users must be logged in.</a:t>
+            </a:r>
+            <a:endParaRPr lang="en-US" sz="1050" dirty="0">
+              <a:latin typeface="Calibri" panose="020F0502020204030204" pitchFamily="34" charset="0"/>
+              <a:ea typeface="Calibri" panose="020F0502020204030204" pitchFamily="34" charset="0"/>
+              <a:cs typeface="Times New Roman" panose="02020603050405020304" pitchFamily="18" charset="0"/>
+            </a:endParaRPr>
+          </a:p>
+          <a:p>
+            <a:pPr marL="742950" lvl="1" indent="-285750">
+              <a:lnSpc>
+                <a:spcPct val="107000"/>
+              </a:lnSpc>
+              <a:spcAft>
+                <a:spcPts val="0"/>
+              </a:spcAft>
+              <a:buFont typeface="Courier New" panose="02070309020205020404" pitchFamily="49" charset="0"/>
+              <a:buChar char="o"/>
+            </a:pPr>
+            <a:r>
+              <a:rPr lang="en-US" b="1" dirty="0" err="1">
+                <a:latin typeface="Calibri" panose="020F0502020204030204" pitchFamily="34" charset="0"/>
+                <a:ea typeface="Calibri" panose="020F0502020204030204" pitchFamily="34" charset="0"/>
+                <a:cs typeface="Times New Roman" panose="02020603050405020304" pitchFamily="18" charset="0"/>
+              </a:rPr>
+              <a:t>Postconditions</a:t>
+            </a:r>
+            <a:r>
+              <a:rPr lang="en-US" b="1" dirty="0">
+                <a:latin typeface="Calibri" panose="020F0502020204030204" pitchFamily="34" charset="0"/>
+                <a:ea typeface="Calibri" panose="020F0502020204030204" pitchFamily="34" charset="0"/>
+                <a:cs typeface="Times New Roman" panose="02020603050405020304" pitchFamily="18" charset="0"/>
+              </a:rPr>
+              <a:t>:</a:t>
+            </a:r>
+            <a:endParaRPr lang="en-US" sz="1050" dirty="0">
+              <a:latin typeface="Calibri" panose="020F0502020204030204" pitchFamily="34" charset="0"/>
+              <a:ea typeface="Calibri" panose="020F0502020204030204" pitchFamily="34" charset="0"/>
+              <a:cs typeface="Times New Roman" panose="02020603050405020304" pitchFamily="18" charset="0"/>
+            </a:endParaRPr>
+          </a:p>
+          <a:p>
+            <a:pPr marL="1143000" lvl="2" indent="-228600">
+              <a:lnSpc>
+                <a:spcPct val="107000"/>
+              </a:lnSpc>
+              <a:spcAft>
+                <a:spcPts val="0"/>
+              </a:spcAft>
+              <a:buFont typeface="Wingdings" panose="05000000000000000000" pitchFamily="2" charset="2"/>
+              <a:buChar char=""/>
+            </a:pPr>
+            <a:r>
+              <a:rPr lang="en-US" dirty="0">
+                <a:latin typeface="Calibri" panose="020F0502020204030204" pitchFamily="34" charset="0"/>
+                <a:ea typeface="Calibri" panose="020F0502020204030204" pitchFamily="34" charset="0"/>
+                <a:cs typeface="Times New Roman" panose="02020603050405020304" pitchFamily="18" charset="0"/>
+              </a:rPr>
+              <a:t>Reservations made by each user will be </a:t>
+            </a:r>
+            <a:r>
+              <a:rPr lang="en-US" dirty="0" smtClean="0">
+                <a:latin typeface="Calibri" panose="020F0502020204030204" pitchFamily="34" charset="0"/>
+                <a:ea typeface="Calibri" panose="020F0502020204030204" pitchFamily="34" charset="0"/>
+                <a:cs typeface="Times New Roman" panose="02020603050405020304" pitchFamily="18" charset="0"/>
+              </a:rPr>
+              <a:t>listed.</a:t>
+            </a:r>
+            <a:endParaRPr lang="en-US" sz="1050" dirty="0" smtClean="0">
+              <a:latin typeface="Calibri" panose="020F0502020204030204" pitchFamily="34" charset="0"/>
+              <a:ea typeface="Calibri" panose="020F0502020204030204" pitchFamily="34" charset="0"/>
+              <a:cs typeface="Times New Roman" panose="02020603050405020304" pitchFamily="18" charset="0"/>
+            </a:endParaRPr>
+          </a:p>
+          <a:p>
+            <a:pPr marL="1143000" lvl="2" indent="-228600">
+              <a:lnSpc>
+                <a:spcPct val="107000"/>
+              </a:lnSpc>
+              <a:spcAft>
+                <a:spcPts val="0"/>
+              </a:spcAft>
+              <a:buFont typeface="Wingdings" panose="05000000000000000000" pitchFamily="2" charset="2"/>
+              <a:buChar char=""/>
+            </a:pPr>
+            <a:r>
+              <a:rPr lang="en-US" dirty="0" smtClean="0">
+                <a:latin typeface="Calibri" panose="020F0502020204030204" pitchFamily="34" charset="0"/>
+                <a:ea typeface="Calibri" panose="020F0502020204030204" pitchFamily="34" charset="0"/>
+                <a:cs typeface="Times New Roman" panose="02020603050405020304" pitchFamily="18" charset="0"/>
+              </a:rPr>
+              <a:t>Map will be viewable</a:t>
+            </a:r>
+            <a:endParaRPr lang="en-US" dirty="0">
+              <a:latin typeface="Calibri" panose="020F0502020204030204" pitchFamily="34" charset="0"/>
+              <a:ea typeface="Calibri" panose="020F0502020204030204" pitchFamily="34" charset="0"/>
+              <a:cs typeface="Times New Roman" panose="02020603050405020304" pitchFamily="18" charset="0"/>
+            </a:endParaRPr>
+          </a:p>
+          <a:p>
+            <a:pPr marL="1143000" lvl="2" indent="-228600">
+              <a:lnSpc>
+                <a:spcPct val="107000"/>
+              </a:lnSpc>
+              <a:spcAft>
+                <a:spcPts val="800"/>
+              </a:spcAft>
+              <a:buFont typeface="Wingdings" panose="05000000000000000000" pitchFamily="2" charset="2"/>
+              <a:buChar char=""/>
+            </a:pPr>
+            <a:r>
+              <a:rPr lang="en-US" dirty="0" smtClean="0"/>
+              <a:t>Calendar </a:t>
+            </a:r>
+            <a:r>
+              <a:rPr lang="en-US" dirty="0"/>
+              <a:t>with available rink times/dates will be </a:t>
+            </a:r>
+            <a:r>
+              <a:rPr lang="en-US" dirty="0" smtClean="0"/>
+              <a:t>viewable. </a:t>
+            </a:r>
+            <a:endParaRPr lang="en-US" sz="1050" dirty="0">
+              <a:latin typeface="Calibri" panose="020F0502020204030204" pitchFamily="34" charset="0"/>
+              <a:ea typeface="Calibri" panose="020F0502020204030204" pitchFamily="34" charset="0"/>
+              <a:cs typeface="Times New Roman" panose="02020603050405020304" pitchFamily="18" charset="0"/>
+            </a:endParaRPr>
+          </a:p>
+        </p:txBody>
+      </p:sp>
+    </p:spTree>
+    <p:extLst>
+      <p:ext uri="{BB962C8B-B14F-4D97-AF65-F5344CB8AC3E}">
+        <p14:creationId xmlns:p14="http://schemas.microsoft.com/office/powerpoint/2010/main" val="4204250649"/>
+      </p:ext>
+    </p:extLst>
+  </p:cSld>
+  <p:clrMapOvr>
+    <a:masterClrMapping/>
+  </p:clrMapOvr>
+  <p:timing>
+    <p:tnLst>
+      <p:par>
+        <p:cTn id="1" dur="indefinite" restart="never" nodeType="tmRoot"/>
+      </p:par>
+    </p:tnLst>
+  </p:timing>
+</p:sld>
+</file>
+
+<file path=ppt/slides/slide9.xml><?xml version="1.0" encoding="utf-8"?>
+<p:sld xmlns:a="http://schemas.openxmlformats.org/drawingml/2006/main" xmlns:r="http://schemas.openxmlformats.org/officeDocument/2006/relationships" xmlns:p="http://schemas.openxmlformats.org/presentationml/2006/main">
+  <p:cSld>
+    <p:spTree>
+      <p:nvGrpSpPr>
+        <p:cNvPr id="1" name=""/>
+        <p:cNvGrpSpPr/>
+        <p:nvPr/>
+      </p:nvGrpSpPr>
+      <p:grpSpPr>
+        <a:xfrm>
+          <a:off x="0" y="0"/>
+          <a:ext cx="0" cy="0"/>
+          <a:chOff x="0" y="0"/>
+          <a:chExt cx="0" cy="0"/>
+        </a:xfrm>
+      </p:grpSpPr>
+      <p:sp>
+        <p:nvSpPr>
+          <p:cNvPr id="2" name="Title 1"/>
+          <p:cNvSpPr>
+            <a:spLocks noGrp="1"/>
+          </p:cNvSpPr>
+          <p:nvPr>
+            <p:ph type="title"/>
+          </p:nvPr>
+        </p:nvSpPr>
+        <p:spPr/>
+        <p:txBody>
+          <a:bodyPr/>
+          <a:lstStyle/>
+          <a:p>
+            <a:r>
+              <a:rPr lang="en-US" dirty="0" smtClean="0"/>
+              <a:t>Wireframe to life</a:t>
+            </a:r>
+            <a:endParaRPr lang="en-US" dirty="0"/>
+          </a:p>
+        </p:txBody>
+      </p:sp>
+    </p:spTree>
+    <p:extLst>
+      <p:ext uri="{BB962C8B-B14F-4D97-AF65-F5344CB8AC3E}">
+        <p14:creationId xmlns:p14="http://schemas.microsoft.com/office/powerpoint/2010/main" val="2981599789"/>
+      </p:ext>
+    </p:extLst>
   </p:cSld>
   <p:clrMapOvr>
     <a:masterClrMapping/>

</xml_diff>

<commit_message>
Updated the next sprint goals on powerpoint doc
</commit_message>
<xml_diff>
--- a/Documentation/4999 - Sprint2.pptx
+++ b/Documentation/4999 - Sprint2.pptx
@@ -5,7 +5,7 @@
     <p:sldMasterId id="2147483659" r:id="rId1"/>
   </p:sldMasterIdLst>
   <p:notesMasterIdLst>
-    <p:notesMasterId r:id="rId15"/>
+    <p:notesMasterId r:id="rId16"/>
   </p:notesMasterIdLst>
   <p:sldIdLst>
     <p:sldId id="256" r:id="rId2"/>
@@ -20,31 +20,30 @@
     <p:sldId id="273" r:id="rId11"/>
     <p:sldId id="274" r:id="rId12"/>
     <p:sldId id="275" r:id="rId13"/>
-    <p:sldId id="264" r:id="rId14"/>
+    <p:sldId id="276" r:id="rId14"/>
+    <p:sldId id="264" r:id="rId15"/>
   </p:sldIdLst>
   <p:sldSz cx="9144000" cy="5143500" type="screen16x9"/>
   <p:notesSz cx="6858000" cy="9144000"/>
   <p:embeddedFontLst>
     <p:embeddedFont>
-      <p:font typeface="Montserrat" panose="020B0604020202020204" charset="0"/>
-      <p:regular r:id="rId16"/>
-      <p:bold r:id="rId17"/>
-      <p:italic r:id="rId18"/>
-      <p:boldItalic r:id="rId19"/>
-    </p:embeddedFont>
-    <p:embeddedFont>
       <p:font typeface="Lato" panose="020B0604020202020204" charset="0"/>
-      <p:regular r:id="rId20"/>
-      <p:bold r:id="rId21"/>
-      <p:italic r:id="rId22"/>
-      <p:boldItalic r:id="rId23"/>
+      <p:regular r:id="rId17"/>
+      <p:bold r:id="rId18"/>
+      <p:italic r:id="rId19"/>
+      <p:boldItalic r:id="rId20"/>
     </p:embeddedFont>
     <p:embeddedFont>
       <p:font typeface="Calibri" panose="020F0502020204030204" pitchFamily="34" charset="0"/>
-      <p:regular r:id="rId24"/>
-      <p:bold r:id="rId25"/>
-      <p:italic r:id="rId26"/>
-      <p:boldItalic r:id="rId27"/>
+      <p:regular r:id="rId21"/>
+      <p:bold r:id="rId22"/>
+      <p:italic r:id="rId23"/>
+      <p:boldItalic r:id="rId24"/>
+    </p:embeddedFont>
+    <p:embeddedFont>
+      <p:font typeface="Montserrat" panose="020B0604020202020204" charset="0"/>
+      <p:regular r:id="rId25"/>
+      <p:bold r:id="rId26"/>
     </p:embeddedFont>
   </p:embeddedFontLst>
   <p:defaultTextStyle>
@@ -435,6 +434,11 @@
         </p:txBody>
       </p:sp>
     </p:spTree>
+    <p:extLst>
+      <p:ext uri="{BB962C8B-B14F-4D97-AF65-F5344CB8AC3E}">
+        <p14:creationId xmlns:p14="http://schemas.microsoft.com/office/powerpoint/2010/main" val="1020251618"/>
+      </p:ext>
+    </p:extLst>
   </p:cSld>
   <p:clrMap bg1="lt1" tx1="dk1" bg2="dk2" tx2="lt2" accent1="accent1" accent2="accent2" accent3="accent3" accent4="accent4" accent5="accent5" accent6="accent6" hlink="hlink" folHlink="folHlink"/>
   <p:notesStyle>
@@ -626,6 +630,11 @@
         </p:txBody>
       </p:sp>
     </p:spTree>
+    <p:extLst>
+      <p:ext uri="{BB962C8B-B14F-4D97-AF65-F5344CB8AC3E}">
+        <p14:creationId xmlns:p14="http://schemas.microsoft.com/office/powerpoint/2010/main" val="2946084488"/>
+      </p:ext>
+    </p:extLst>
   </p:cSld>
   <p:clrMapOvr>
     <a:masterClrMapping/>
@@ -727,6 +736,11 @@
         </p:txBody>
       </p:sp>
     </p:spTree>
+    <p:extLst>
+      <p:ext uri="{BB962C8B-B14F-4D97-AF65-F5344CB8AC3E}">
+        <p14:creationId xmlns:p14="http://schemas.microsoft.com/office/powerpoint/2010/main" val="3384822586"/>
+      </p:ext>
+    </p:extLst>
   </p:cSld>
   <p:clrMapOvr>
     <a:masterClrMapping/>
@@ -7581,6 +7595,89 @@
   <p:cSld>
     <p:spTree>
       <p:nvGrpSpPr>
+        <p:cNvPr id="1" name=""/>
+        <p:cNvGrpSpPr/>
+        <p:nvPr/>
+      </p:nvGrpSpPr>
+      <p:grpSpPr>
+        <a:xfrm>
+          <a:off x="0" y="0"/>
+          <a:ext cx="0" cy="0"/>
+          <a:chOff x="0" y="0"/>
+          <a:chExt cx="0" cy="0"/>
+        </a:xfrm>
+      </p:grpSpPr>
+      <p:sp>
+        <p:nvSpPr>
+          <p:cNvPr id="2" name="Title 1"/>
+          <p:cNvSpPr>
+            <a:spLocks noGrp="1"/>
+          </p:cNvSpPr>
+          <p:nvPr>
+            <p:ph type="title"/>
+          </p:nvPr>
+        </p:nvSpPr>
+        <p:spPr/>
+        <p:txBody>
+          <a:bodyPr/>
+          <a:lstStyle/>
+          <a:p>
+            <a:r>
+              <a:rPr lang="en-US" dirty="0" smtClean="0"/>
+              <a:t>Next Sprint Goals</a:t>
+            </a:r>
+            <a:endParaRPr lang="en-US" dirty="0"/>
+          </a:p>
+        </p:txBody>
+      </p:sp>
+      <p:sp>
+        <p:nvSpPr>
+          <p:cNvPr id="3" name="Text Placeholder 2"/>
+          <p:cNvSpPr>
+            <a:spLocks noGrp="1"/>
+          </p:cNvSpPr>
+          <p:nvPr>
+            <p:ph type="body" idx="1"/>
+          </p:nvPr>
+        </p:nvSpPr>
+        <p:spPr/>
+        <p:txBody>
+          <a:bodyPr/>
+          <a:lstStyle/>
+          <a:p>
+            <a:r>
+              <a:rPr lang="en-US" sz="1600" dirty="0" smtClean="0"/>
+              <a:t>Have the user page initial design done and created</a:t>
+            </a:r>
+            <a:endParaRPr lang="en-US" sz="1600" dirty="0"/>
+          </a:p>
+          <a:p>
+            <a:r>
+              <a:rPr lang="en-US" sz="1600" dirty="0" smtClean="0"/>
+              <a:t>Have the Database Architecture setup and configured correctly</a:t>
+            </a:r>
+            <a:endParaRPr lang="en-US" sz="1600" dirty="0"/>
+          </a:p>
+        </p:txBody>
+      </p:sp>
+    </p:spTree>
+    <p:extLst>
+      <p:ext uri="{BB962C8B-B14F-4D97-AF65-F5344CB8AC3E}">
+        <p14:creationId xmlns:p14="http://schemas.microsoft.com/office/powerpoint/2010/main" val="1733570177"/>
+      </p:ext>
+    </p:extLst>
+  </p:cSld>
+  <p:clrMapOvr>
+    <a:masterClrMapping/>
+  </p:clrMapOvr>
+</p:sld>
+</file>
+
+<file path=ppt/slides/slide14.xml><?xml version="1.0" encoding="utf-8"?>
+<p:sld xmlns:a="http://schemas.openxmlformats.org/drawingml/2006/main" xmlns:r="http://schemas.openxmlformats.org/officeDocument/2006/relationships" xmlns:p="http://schemas.openxmlformats.org/presentationml/2006/main">
+  <p:cSld>
+    <p:spTree>
+      <p:nvGrpSpPr>
         <p:cNvPr id="1" name="Shape 181"/>
         <p:cNvGrpSpPr/>
         <p:nvPr/>

</xml_diff>